<commit_message>
updated power point with pictures and main screen started
</commit_message>
<xml_diff>
--- a/lifefitppt.pptx
+++ b/lifefitppt.pptx
@@ -622,9 +622,7 @@
               <c:showPercent val="1"/>
               <c:showBubbleSize val="0"/>
               <c:extLst>
-                <c:ext xmlns:c15="http://schemas.microsoft.com/office/drawing/2012/chart" uri="{CE6537A1-D6FC-4f65-9D91-7224C49458BB}">
-                  <c15:layout/>
-                </c:ext>
+                <c:ext xmlns:c15="http://schemas.microsoft.com/office/drawing/2012/chart" uri="{CE6537A1-D6FC-4f65-9D91-7224C49458BB}"/>
                 <c:ext xmlns:c16="http://schemas.microsoft.com/office/drawing/2014/chart" uri="{C3380CC4-5D6E-409C-BE32-E72D297353CC}">
                   <c16:uniqueId val="{00000001-029C-44DD-BCCB-51996A254BEF}"/>
                 </c:ext>
@@ -646,9 +644,7 @@
               <c:showPercent val="1"/>
               <c:showBubbleSize val="0"/>
               <c:extLst>
-                <c:ext xmlns:c15="http://schemas.microsoft.com/office/drawing/2012/chart" uri="{CE6537A1-D6FC-4f65-9D91-7224C49458BB}">
-                  <c15:layout/>
-                </c:ext>
+                <c:ext xmlns:c15="http://schemas.microsoft.com/office/drawing/2012/chart" uri="{CE6537A1-D6FC-4f65-9D91-7224C49458BB}"/>
                 <c:ext xmlns:c16="http://schemas.microsoft.com/office/drawing/2014/chart" uri="{C3380CC4-5D6E-409C-BE32-E72D297353CC}">
                   <c16:uniqueId val="{00000003-029C-44DD-BCCB-51996A254BEF}"/>
                 </c:ext>
@@ -670,9 +666,7 @@
               <c:showPercent val="1"/>
               <c:showBubbleSize val="0"/>
               <c:extLst>
-                <c:ext xmlns:c15="http://schemas.microsoft.com/office/drawing/2012/chart" uri="{CE6537A1-D6FC-4f65-9D91-7224C49458BB}">
-                  <c15:layout/>
-                </c:ext>
+                <c:ext xmlns:c15="http://schemas.microsoft.com/office/drawing/2012/chart" uri="{CE6537A1-D6FC-4f65-9D91-7224C49458BB}"/>
                 <c:ext xmlns:c16="http://schemas.microsoft.com/office/drawing/2014/chart" uri="{C3380CC4-5D6E-409C-BE32-E72D297353CC}">
                   <c16:uniqueId val="{00000005-029C-44DD-BCCB-51996A254BEF}"/>
                 </c:ext>
@@ -798,7 +792,6 @@
     </c:plotArea>
     <c:legend>
       <c:legendPos val="r"/>
-      <c:layout/>
       <c:overlay val="0"/>
       <c:spPr>
         <a:solidFill>
@@ -13698,19 +13691,19 @@
 
 <file path=customXml/item1.xml><?xml version="1.0" encoding="utf-8"?>
 <Control xmlns="http://schemas.microsoft.com/VisualStudio/2011/storyboarding/control">
-  <Id Name="System.Storyboarding.Common.Text" Revision="1" Stencil="System.Storyboarding.Common" StencilVersion="0.1"/>
+  <Id Name="System.Storyboarding.WindowsPhone.ApplicationBar" Revision="1" Stencil="System.Storyboarding.WindowsPhone" StencilVersion="0.1"/>
 </Control>
 </file>
 
 <file path=customXml/item10.xml><?xml version="1.0" encoding="utf-8"?>
 <Control xmlns="http://schemas.microsoft.com/VisualStudio/2011/storyboarding/control">
-  <Id Name="System.Storyboarding.WindowsPhoneIcons.Minus" Revision="1" Stencil="System.Storyboarding.WindowsPhoneIcons" StencilVersion="0.1"/>
+  <Id Name="System.Storyboarding.Common.Text" Revision="1" Stencil="System.Storyboarding.Common" StencilVersion="0.1"/>
 </Control>
 </file>
 
 <file path=customXml/item11.xml><?xml version="1.0" encoding="utf-8"?>
 <Control xmlns="http://schemas.microsoft.com/VisualStudio/2011/storyboarding/control">
-  <Id Name="System.Storyboarding.WindowsPhoneIcons.BaseCircle" Revision="1" Stencil="System.Storyboarding.WindowsPhoneIcons" StencilVersion="0.1"/>
+  <Id Name="System.Storyboarding.Common.Text" Revision="1" Stencil="System.Storyboarding.Common" StencilVersion="0.1"/>
 </Control>
 </file>
 
@@ -13722,121 +13715,121 @@
 
 <file path=customXml/item13.xml><?xml version="1.0" encoding="utf-8"?>
 <Control xmlns="http://schemas.microsoft.com/VisualStudio/2011/storyboarding/control">
-  <Id Name="System.Storyboarding.WindowsPhoneIcons.AddToFavorites" Revision="1" Stencil="System.Storyboarding.WindowsPhoneIcons" StencilVersion="0.1"/>
+  <Id Name="System.Storyboarding.Common.Breadcrumb" Revision="1" Stencil="System.Storyboarding.Common" StencilVersion="0.1"/>
 </Control>
 </file>
 
 <file path=customXml/item14.xml><?xml version="1.0" encoding="utf-8"?>
 <Control xmlns="http://schemas.microsoft.com/VisualStudio/2011/storyboarding/control">
-  <Id Name="System.Storyboarding.WindowsPhoneIcons.Minus" Revision="1" Stencil="System.Storyboarding.WindowsPhoneIcons" StencilVersion="0.1"/>
+  <Id Name="System.Storyboarding.WindowsPhoneIcons.BaseCircle" Revision="1" Stencil="System.Storyboarding.WindowsPhoneIcons" StencilVersion="0.1"/>
 </Control>
 </file>
 
 <file path=customXml/item15.xml><?xml version="1.0" encoding="utf-8"?>
 <Control xmlns="http://schemas.microsoft.com/VisualStudio/2011/storyboarding/control">
-  <Id Name="System.Storyboarding.WindowsPhoneIcons.Minus" Revision="1" Stencil="System.Storyboarding.WindowsPhoneIcons" StencilVersion="0.1"/>
+  <Id Name="System.Storyboarding.Media.Image" Revision="1" Stencil="System.Storyboarding.Media" StencilVersion="0.1"/>
 </Control>
 </file>
 
 <file path=customXml/item16.xml><?xml version="1.0" encoding="utf-8"?>
 <Control xmlns="http://schemas.microsoft.com/VisualStudio/2011/storyboarding/control">
-  <Id Name="System.Storyboarding.Common.Breadcrumb" Revision="1" Stencil="System.Storyboarding.Common" StencilVersion="0.1"/>
+  <Id Name="System.Storyboarding.Common.Text" Revision="1" Stencil="System.Storyboarding.Common" StencilVersion="0.1"/>
 </Control>
 </file>
 
 <file path=customXml/item17.xml><?xml version="1.0" encoding="utf-8"?>
 <Control xmlns="http://schemas.microsoft.com/VisualStudio/2011/storyboarding/control">
-  <Id Name="System.Storyboarding.WindowsPhone.ApplicationBar" Revision="1" Stencil="System.Storyboarding.WindowsPhone" StencilVersion="0.1"/>
+  <Id Name="System.Storyboarding.WindowsPhoneIcons.Minus" Revision="1" Stencil="System.Storyboarding.WindowsPhoneIcons" StencilVersion="0.1"/>
 </Control>
 </file>
 
 <file path=customXml/item18.xml><?xml version="1.0" encoding="utf-8"?>
 <Control xmlns="http://schemas.microsoft.com/VisualStudio/2011/storyboarding/control">
-  <Id Name="System.Storyboarding.Media.PieChart" Revision="1" Stencil="System.Storyboarding.Media" StencilVersion="0.1"/>
+  <Id Name="System.Storyboarding.Common.TextArea" Revision="1" Stencil="System.Storyboarding.Common" StencilVersion="0.1"/>
 </Control>
 </file>
 
 <file path=customXml/item19.xml><?xml version="1.0" encoding="utf-8"?>
 <Control xmlns="http://schemas.microsoft.com/VisualStudio/2011/storyboarding/control">
-  <Id Name="System.Storyboarding.WindowsPhoneIcons.BaseCircle" Revision="1" Stencil="System.Storyboarding.WindowsPhoneIcons" StencilVersion="0.1"/>
+  <Id Name="System.Storyboarding.WindowsPhoneIcons.Minus" Revision="1" Stencil="System.Storyboarding.WindowsPhoneIcons" StencilVersion="0.1"/>
 </Control>
 </file>
 
 <file path=customXml/item2.xml><?xml version="1.0" encoding="utf-8"?>
 <Control xmlns="http://schemas.microsoft.com/VisualStudio/2011/storyboarding/control">
-  <Id Name="System.Storyboarding.WindowsPhoneIcons.BaseCircle" Revision="1" Stencil="System.Storyboarding.WindowsPhoneIcons" StencilVersion="0.1"/>
+  <Id Name="System.Storyboarding.WindowsPhoneIcons.OverflowDots" Revision="1" Stencil="System.Storyboarding.WindowsPhoneIcons" StencilVersion="0.1"/>
 </Control>
 </file>
 
 <file path=customXml/item20.xml><?xml version="1.0" encoding="utf-8"?>
 <Control xmlns="http://schemas.microsoft.com/VisualStudio/2011/storyboarding/control">
-  <Id Name="System.Storyboarding.Common.Text" Revision="1" Stencil="System.Storyboarding.Common" StencilVersion="0.1"/>
+  <Id Name="System.Storyboarding.WindowsPhoneIcons.BaseCircle" Revision="1" Stencil="System.Storyboarding.WindowsPhoneIcons" StencilVersion="0.1"/>
 </Control>
 </file>
 
 <file path=customXml/item21.xml><?xml version="1.0" encoding="utf-8"?>
 <Control xmlns="http://schemas.microsoft.com/VisualStudio/2011/storyboarding/control">
-  <Id Name="System.Storyboarding.WindowsPhoneIcons.Minus" Revision="1" Stencil="System.Storyboarding.WindowsPhoneIcons" StencilVersion="0.1"/>
+  <Id Name="System.Storyboarding.Common.Text" Revision="1" Stencil="System.Storyboarding.Common" StencilVersion="0.1"/>
 </Control>
 </file>
 
 <file path=customXml/item22.xml><?xml version="1.0" encoding="utf-8"?>
 <Control xmlns="http://schemas.microsoft.com/VisualStudio/2011/storyboarding/control">
-  <Id Name="System.Storyboarding.WindowsPhoneIcons.AddToFavorites" Revision="1" Stencil="System.Storyboarding.WindowsPhoneIcons" StencilVersion="0.1"/>
+  <Id Name="System.Storyboarding.Common.Text" Revision="1" Stencil="System.Storyboarding.Common" StencilVersion="0.1"/>
 </Control>
 </file>
 
 <file path=customXml/item23.xml><?xml version="1.0" encoding="utf-8"?>
 <Control xmlns="http://schemas.microsoft.com/VisualStudio/2011/storyboarding/control">
-  <Id Name="System.Storyboarding.WindowsPhoneIcons.BaseCircle" Revision="1" Stencil="System.Storyboarding.WindowsPhoneIcons" StencilVersion="0.1"/>
+  <Id Name="System.Storyboarding.WindowsPhoneIcons.Minus" Revision="1" Stencil="System.Storyboarding.WindowsPhoneIcons" StencilVersion="0.1"/>
 </Control>
 </file>
 
 <file path=customXml/item24.xml><?xml version="1.0" encoding="utf-8"?>
 <Control xmlns="http://schemas.microsoft.com/VisualStudio/2011/storyboarding/control">
-  <Id Name="System.Storyboarding.Common.Breadcrumb" Revision="1" Stencil="System.Storyboarding.Common" StencilVersion="0.1"/>
+  <Id Name="System.Storyboarding.WindowsPhoneIcons.BaseCircle" Revision="1" Stencil="System.Storyboarding.WindowsPhoneIcons" StencilVersion="0.1"/>
 </Control>
 </file>
 
 <file path=customXml/item25.xml><?xml version="1.0" encoding="utf-8"?>
 <Control xmlns="http://schemas.microsoft.com/VisualStudio/2011/storyboarding/control">
-  <Id Name="System.Storyboarding.WindowsPhone.ApplicationBar" Revision="1" Stencil="System.Storyboarding.WindowsPhone" StencilVersion="0.1"/>
+  <Id Name="System.Storyboarding.Common.Text" Revision="1" Stencil="System.Storyboarding.Common" StencilVersion="0.1"/>
 </Control>
 </file>
 
 <file path=customXml/item26.xml><?xml version="1.0" encoding="utf-8"?>
 <Control xmlns="http://schemas.microsoft.com/VisualStudio/2011/storyboarding/control">
-  <Id Name="System.Storyboarding.Common.Text" Revision="1" Stencil="System.Storyboarding.Common" StencilVersion="0.1"/>
+  <Id Name="System.Storyboarding.WindowsPhoneIcons.Minus" Revision="1" Stencil="System.Storyboarding.WindowsPhoneIcons" StencilVersion="0.1"/>
 </Control>
 </file>
 
 <file path=customXml/item27.xml><?xml version="1.0" encoding="utf-8"?>
 <Control xmlns="http://schemas.microsoft.com/VisualStudio/2011/storyboarding/control">
-  <Id Name="System.Storyboarding.Common.Text" Revision="1" Stencil="System.Storyboarding.Common" StencilVersion="0.1"/>
+  <Id Name="System.Storyboarding.Media.PieChart" Revision="1" Stencil="System.Storyboarding.Media" StencilVersion="0.1"/>
 </Control>
 </file>
 
 <file path=customXml/item28.xml><?xml version="1.0" encoding="utf-8"?>
 <Control xmlns="http://schemas.microsoft.com/VisualStudio/2011/storyboarding/control">
-  <Id Name="System.Storyboarding.Common.Text" Revision="1" Stencil="System.Storyboarding.Common" StencilVersion="0.1"/>
+  <Id Name="System.Storyboarding.WindowsPhoneIcons.BaseCircle" Revision="1" Stencil="System.Storyboarding.WindowsPhoneIcons" StencilVersion="0.1"/>
 </Control>
 </file>
 
 <file path=customXml/item29.xml><?xml version="1.0" encoding="utf-8"?>
 <Control xmlns="http://schemas.microsoft.com/VisualStudio/2011/storyboarding/control">
-  <Id Name="System.Storyboarding.Common.TextArea" Revision="1" Stencil="System.Storyboarding.Common" StencilVersion="0.1"/>
+  <Id Name="System.Storyboarding.WindowsPhoneIcons.Minus" Revision="1" Stencil="System.Storyboarding.WindowsPhoneIcons" StencilVersion="0.1"/>
 </Control>
 </file>
 
 <file path=customXml/item3.xml><?xml version="1.0" encoding="utf-8"?>
 <Control xmlns="http://schemas.microsoft.com/VisualStudio/2011/storyboarding/control">
-  <Id Name="System.Storyboarding.WindowsPhoneIcons.Minus" Revision="1" Stencil="System.Storyboarding.WindowsPhoneIcons" StencilVersion="0.1"/>
+  <Id Name="System.Storyboarding.Common.TextArea" Revision="1" Stencil="System.Storyboarding.Common" StencilVersion="0.1"/>
 </Control>
 </file>
 
 <file path=customXml/item30.xml><?xml version="1.0" encoding="utf-8"?>
 <Control xmlns="http://schemas.microsoft.com/VisualStudio/2011/storyboarding/control">
-  <Id Name="System.Storyboarding.WindowsPhoneIcons.OverflowDots" Revision="1" Stencil="System.Storyboarding.WindowsPhoneIcons" StencilVersion="0.1"/>
+  <Id Name="System.Storyboarding.WindowsPhoneIcons.AddToFavorites" Revision="1" Stencil="System.Storyboarding.WindowsPhoneIcons" StencilVersion="0.1"/>
 </Control>
 </file>
 
@@ -13848,43 +13841,43 @@
 
 <file path=customXml/item32.xml><?xml version="1.0" encoding="utf-8"?>
 <Control xmlns="http://schemas.microsoft.com/VisualStudio/2011/storyboarding/control">
-  <Id Name="System.Storyboarding.WindowsPhoneIcons.BaseCircle" Revision="1" Stencil="System.Storyboarding.WindowsPhoneIcons" StencilVersion="0.1"/>
+  <Id Name="System.Storyboarding.WindowsPhoneIcons.OverflowDots" Revision="1" Stencil="System.Storyboarding.WindowsPhoneIcons" StencilVersion="0.1"/>
 </Control>
 </file>
 
 <file path=customXml/item33.xml><?xml version="1.0" encoding="utf-8"?>
 <Control xmlns="http://schemas.microsoft.com/VisualStudio/2011/storyboarding/control">
-  <Id Name="System.Storyboarding.WindowsPhoneIcons.OverflowDots" Revision="1" Stencil="System.Storyboarding.WindowsPhoneIcons" StencilVersion="0.1"/>
+  <Id Name="System.Storyboarding.Common.TextArea" Revision="1" Stencil="System.Storyboarding.Common" StencilVersion="0.1"/>
 </Control>
 </file>
 
 <file path=customXml/item34.xml><?xml version="1.0" encoding="utf-8"?>
 <Control xmlns="http://schemas.microsoft.com/VisualStudio/2011/storyboarding/control">
-  <Id Name="System.Storyboarding.Common.Text" Revision="1" Stencil="System.Storyboarding.Common" StencilVersion="0.1"/>
+  <Id Name="System.Storyboarding.WindowsPhoneIcons.Minus" Revision="1" Stencil="System.Storyboarding.WindowsPhoneIcons" StencilVersion="0.1"/>
 </Control>
 </file>
 
 <file path=customXml/item35.xml><?xml version="1.0" encoding="utf-8"?>
 <Control xmlns="http://schemas.microsoft.com/VisualStudio/2011/storyboarding/control">
-  <Id Name="System.Storyboarding.Common.TextArea" Revision="1" Stencil="System.Storyboarding.Common" StencilVersion="0.1"/>
+  <Id Name="System.Storyboarding.WindowsPhoneIcons.BaseCircle" Revision="1" Stencil="System.Storyboarding.WindowsPhoneIcons" StencilVersion="0.1"/>
 </Control>
 </file>
 
 <file path=customXml/item36.xml><?xml version="1.0" encoding="utf-8"?>
 <Control xmlns="http://schemas.microsoft.com/VisualStudio/2011/storyboarding/control">
-  <Id Name="System.Storyboarding.Common.Text" Revision="1" Stencil="System.Storyboarding.Common" StencilVersion="0.1"/>
+  <Id Name="System.Storyboarding.WindowsPhoneIcons.Minus" Revision="1" Stencil="System.Storyboarding.WindowsPhoneIcons" StencilVersion="0.1"/>
 </Control>
 </file>
 
 <file path=customXml/item37.xml><?xml version="1.0" encoding="utf-8"?>
 <Control xmlns="http://schemas.microsoft.com/VisualStudio/2011/storyboarding/control">
-  <Id Name="System.Storyboarding.Media.Image" Revision="1" Stencil="System.Storyboarding.Media" StencilVersion="0.1"/>
+  <Id Name="System.Storyboarding.WindowsPhoneIcons.AddToFavorites" Revision="1" Stencil="System.Storyboarding.WindowsPhoneIcons" StencilVersion="0.1"/>
 </Control>
 </file>
 
 <file path=customXml/item38.xml><?xml version="1.0" encoding="utf-8"?>
 <Control xmlns="http://schemas.microsoft.com/VisualStudio/2011/storyboarding/control">
-  <Id Name="System.Storyboarding.Common.TextArea" Revision="1" Stencil="System.Storyboarding.Common" StencilVersion="0.1"/>
+  <Id Name="System.Storyboarding.Media.PieChart" Revision="1" Stencil="System.Storyboarding.Media" StencilVersion="0.1"/>
 </Control>
 </file>
 
@@ -13896,7 +13889,7 @@
 
 <file path=customXml/item4.xml><?xml version="1.0" encoding="utf-8"?>
 <Control xmlns="http://schemas.microsoft.com/VisualStudio/2011/storyboarding/control">
-  <Id Name="System.Storyboarding.Media.PieChart" Revision="1" Stencil="System.Storyboarding.Media" StencilVersion="0.1"/>
+  <Id Name="System.Storyboarding.WindowsPhoneIcons.OverflowDots" Revision="1" Stencil="System.Storyboarding.WindowsPhoneIcons" StencilVersion="0.1"/>
 </Control>
 </file>
 
@@ -13908,13 +13901,13 @@
 
 <file path=customXml/item41.xml><?xml version="1.0" encoding="utf-8"?>
 <Control xmlns="http://schemas.microsoft.com/VisualStudio/2011/storyboarding/control">
-  <Id Name="System.Storyboarding.Common.Text" Revision="1" Stencil="System.Storyboarding.Common" StencilVersion="0.1"/>
+  <Id Name="System.Storyboarding.WindowsPhoneIcons.Minus" Revision="1" Stencil="System.Storyboarding.WindowsPhoneIcons" StencilVersion="0.1"/>
 </Control>
 </file>
 
 <file path=customXml/item42.xml><?xml version="1.0" encoding="utf-8"?>
 <Control xmlns="http://schemas.microsoft.com/VisualStudio/2011/storyboarding/control">
-  <Id Name="System.Storyboarding.WindowsPhoneIcons.Minus" Revision="1" Stencil="System.Storyboarding.WindowsPhoneIcons" StencilVersion="0.1"/>
+  <Id Name="System.Storyboarding.Common.Text" Revision="1" Stencil="System.Storyboarding.Common" StencilVersion="0.1"/>
 </Control>
 </file>
 
@@ -13926,59 +13919,67 @@
 
 <file path=customXml/item44.xml><?xml version="1.0" encoding="utf-8"?>
 <Control xmlns="http://schemas.microsoft.com/VisualStudio/2011/storyboarding/control">
-  <Id Name="System.Storyboarding.WindowsPhoneIcons.Minus" Revision="1" Stencil="System.Storyboarding.WindowsPhoneIcons" StencilVersion="0.1"/>
+  <Id Name="System.Storyboarding.Common.Breadcrumb" Revision="1" Stencil="System.Storyboarding.Common" StencilVersion="0.1"/>
 </Control>
 </file>
 
 <file path=customXml/item45.xml><?xml version="1.0" encoding="utf-8"?>
 <Control xmlns="http://schemas.microsoft.com/VisualStudio/2011/storyboarding/control">
-  <Id Name="System.Storyboarding.WindowsPhoneIcons.Minus" Revision="1" Stencil="System.Storyboarding.WindowsPhoneIcons" StencilVersion="0.1"/>
+  <Id Name="System.Storyboarding.Media.Image" Revision="1" Stencil="System.Storyboarding.Media" StencilVersion="0.1"/>
 </Control>
 </file>
 
 <file path=customXml/item46.xml><?xml version="1.0" encoding="utf-8"?>
 <Control xmlns="http://schemas.microsoft.com/VisualStudio/2011/storyboarding/control">
-  <Id Name="System.Storyboarding.WindowsPhoneIcons.OverflowDots" Revision="1" Stencil="System.Storyboarding.WindowsPhoneIcons" StencilVersion="0.1"/>
+  <Id Name="System.Storyboarding.WindowsPhoneIcons.BaseCircle" Revision="1" Stencil="System.Storyboarding.WindowsPhoneIcons" StencilVersion="0.1"/>
 </Control>
 </file>
 
 <file path=customXml/item47.xml><?xml version="1.0" encoding="utf-8"?>
 <Control xmlns="http://schemas.microsoft.com/VisualStudio/2011/storyboarding/control">
-  <Id Name="System.Storyboarding.Common.Breadcrumb" Revision="1" Stencil="System.Storyboarding.Common" StencilVersion="0.1"/>
+  <Id Name="System.Storyboarding.WindowsPhone.ApplicationBar" Revision="1" Stencil="System.Storyboarding.WindowsPhone" StencilVersion="0.1"/>
 </Control>
 </file>
 
 <file path=customXml/item5.xml><?xml version="1.0" encoding="utf-8"?>
 <Control xmlns="http://schemas.microsoft.com/VisualStudio/2011/storyboarding/control">
-  <Id Name="System.Storyboarding.Common.TextArea" Revision="1" Stencil="System.Storyboarding.Common" StencilVersion="0.1"/>
+  <Id Name="System.Storyboarding.WindowsPhoneIcons.BaseCircle" Revision="1" Stencil="System.Storyboarding.WindowsPhoneIcons" StencilVersion="0.1"/>
 </Control>
 </file>
 
 <file path=customXml/item6.xml><?xml version="1.0" encoding="utf-8"?>
 <Control xmlns="http://schemas.microsoft.com/VisualStudio/2011/storyboarding/control">
-  <Id Name="System.Storyboarding.Common.Text" Revision="1" Stencil="System.Storyboarding.Common" StencilVersion="0.1"/>
+  <Id Name="System.Storyboarding.Common.Breadcrumb" Revision="1" Stencil="System.Storyboarding.Common" StencilVersion="0.1"/>
 </Control>
 </file>
 
 <file path=customXml/item7.xml><?xml version="1.0" encoding="utf-8"?>
 <Control xmlns="http://schemas.microsoft.com/VisualStudio/2011/storyboarding/control">
-  <Id Name="System.Storyboarding.Media.Image" Revision="1" Stencil="System.Storyboarding.Media" StencilVersion="0.1"/>
+  <Id Name="System.Storyboarding.Common.Text" Revision="1" Stencil="System.Storyboarding.Common" StencilVersion="0.1"/>
 </Control>
 </file>
 
 <file path=customXml/item8.xml><?xml version="1.0" encoding="utf-8"?>
 <Control xmlns="http://schemas.microsoft.com/VisualStudio/2011/storyboarding/control">
-  <Id Name="System.Storyboarding.WindowsPhoneIcons.BaseCircle" Revision="1" Stencil="System.Storyboarding.WindowsPhoneIcons" StencilVersion="0.1"/>
+  <Id Name="System.Storyboarding.Common.TextArea" Revision="1" Stencil="System.Storyboarding.Common" StencilVersion="0.1"/>
 </Control>
 </file>
 
 <file path=customXml/item9.xml><?xml version="1.0" encoding="utf-8"?>
 <Control xmlns="http://schemas.microsoft.com/VisualStudio/2011/storyboarding/control">
-  <Id Name="System.Storyboarding.WindowsPhoneIcons.BaseCircle" Revision="1" Stencil="System.Storyboarding.WindowsPhoneIcons" StencilVersion="0.1"/>
+  <Id Name="System.Storyboarding.Common.Text" Revision="1" Stencil="System.Storyboarding.Common" StencilVersion="0.1"/>
 </Control>
 </file>
 
 <file path=customXml/itemProps1.xml><?xml version="1.0" encoding="utf-8"?>
+<ds:datastoreItem xmlns:ds="http://schemas.openxmlformats.org/officeDocument/2006/customXml" ds:itemID="{F7171423-D758-4661-A1CD-668A1B96AFB8}">
+  <ds:schemaRefs>
+    <ds:schemaRef ds:uri="http://schemas.microsoft.com/VisualStudio/2011/storyboarding/control"/>
+  </ds:schemaRefs>
+</ds:datastoreItem>
+</file>
+
+<file path=customXml/itemProps10.xml><?xml version="1.0" encoding="utf-8"?>
 <ds:datastoreItem xmlns:ds="http://schemas.openxmlformats.org/officeDocument/2006/customXml" ds:itemID="{635C062B-A454-4601-A040-4395FFED47FD}">
   <ds:schemaRefs>
     <ds:schemaRef ds:uri="http://schemas.microsoft.com/VisualStudio/2011/storyboarding/control"/>
@@ -13986,7 +13987,111 @@
 </ds:datastoreItem>
 </file>
 
-<file path=customXml/itemProps10.xml><?xml version="1.0" encoding="utf-8"?>
+<file path=customXml/itemProps11.xml><?xml version="1.0" encoding="utf-8"?>
+<ds:datastoreItem xmlns:ds="http://schemas.openxmlformats.org/officeDocument/2006/customXml" ds:itemID="{70E72DF6-3694-4E6B-B583-2E6362F2B9A9}">
+  <ds:schemaRefs>
+    <ds:schemaRef ds:uri="http://schemas.microsoft.com/VisualStudio/2011/storyboarding/control"/>
+  </ds:schemaRefs>
+</ds:datastoreItem>
+</file>
+
+<file path=customXml/itemProps12.xml><?xml version="1.0" encoding="utf-8"?>
+<ds:datastoreItem xmlns:ds="http://schemas.openxmlformats.org/officeDocument/2006/customXml" ds:itemID="{37FE8332-15AE-42AB-B658-6CA650AB87C9}">
+  <ds:schemaRefs>
+    <ds:schemaRef ds:uri="http://schemas.microsoft.com/VisualStudio/2011/storyboarding/control"/>
+  </ds:schemaRefs>
+</ds:datastoreItem>
+</file>
+
+<file path=customXml/itemProps13.xml><?xml version="1.0" encoding="utf-8"?>
+<ds:datastoreItem xmlns:ds="http://schemas.openxmlformats.org/officeDocument/2006/customXml" ds:itemID="{99C67ED5-9855-430E-A3A4-0E30BEB0D024}">
+  <ds:schemaRefs>
+    <ds:schemaRef ds:uri="http://schemas.microsoft.com/VisualStudio/2011/storyboarding/control"/>
+  </ds:schemaRefs>
+</ds:datastoreItem>
+</file>
+
+<file path=customXml/itemProps14.xml><?xml version="1.0" encoding="utf-8"?>
+<ds:datastoreItem xmlns:ds="http://schemas.openxmlformats.org/officeDocument/2006/customXml" ds:itemID="{F9465E2D-3DCD-4B6E-83BF-F9A530097531}">
+  <ds:schemaRefs>
+    <ds:schemaRef ds:uri="http://schemas.microsoft.com/VisualStudio/2011/storyboarding/control"/>
+  </ds:schemaRefs>
+</ds:datastoreItem>
+</file>
+
+<file path=customXml/itemProps15.xml><?xml version="1.0" encoding="utf-8"?>
+<ds:datastoreItem xmlns:ds="http://schemas.openxmlformats.org/officeDocument/2006/customXml" ds:itemID="{EA9F5074-9F3D-4DB7-8B97-43B1B2E60445}">
+  <ds:schemaRefs>
+    <ds:schemaRef ds:uri="http://schemas.microsoft.com/VisualStudio/2011/storyboarding/control"/>
+  </ds:schemaRefs>
+</ds:datastoreItem>
+</file>
+
+<file path=customXml/itemProps16.xml><?xml version="1.0" encoding="utf-8"?>
+<ds:datastoreItem xmlns:ds="http://schemas.openxmlformats.org/officeDocument/2006/customXml" ds:itemID="{699FD775-CD87-43C7-BED3-C99D7D1D0F44}">
+  <ds:schemaRefs>
+    <ds:schemaRef ds:uri="http://schemas.microsoft.com/VisualStudio/2011/storyboarding/control"/>
+  </ds:schemaRefs>
+</ds:datastoreItem>
+</file>
+
+<file path=customXml/itemProps17.xml><?xml version="1.0" encoding="utf-8"?>
+<ds:datastoreItem xmlns:ds="http://schemas.openxmlformats.org/officeDocument/2006/customXml" ds:itemID="{B6C0F96A-AED6-437F-A71B-DE5297FACAE5}">
+  <ds:schemaRefs>
+    <ds:schemaRef ds:uri="http://schemas.microsoft.com/VisualStudio/2011/storyboarding/control"/>
+  </ds:schemaRefs>
+</ds:datastoreItem>
+</file>
+
+<file path=customXml/itemProps18.xml><?xml version="1.0" encoding="utf-8"?>
+<ds:datastoreItem xmlns:ds="http://schemas.openxmlformats.org/officeDocument/2006/customXml" ds:itemID="{E108BEC3-0795-4CAB-9EF4-D252AF70CF15}">
+  <ds:schemaRefs>
+    <ds:schemaRef ds:uri="http://schemas.microsoft.com/VisualStudio/2011/storyboarding/control"/>
+  </ds:schemaRefs>
+</ds:datastoreItem>
+</file>
+
+<file path=customXml/itemProps19.xml><?xml version="1.0" encoding="utf-8"?>
+<ds:datastoreItem xmlns:ds="http://schemas.openxmlformats.org/officeDocument/2006/customXml" ds:itemID="{2B7913F1-1AA3-45B3-BC9F-F7DB0444A344}">
+  <ds:schemaRefs>
+    <ds:schemaRef ds:uri="http://schemas.microsoft.com/VisualStudio/2011/storyboarding/control"/>
+  </ds:schemaRefs>
+</ds:datastoreItem>
+</file>
+
+<file path=customXml/itemProps2.xml><?xml version="1.0" encoding="utf-8"?>
+<ds:datastoreItem xmlns:ds="http://schemas.openxmlformats.org/officeDocument/2006/customXml" ds:itemID="{54E314B1-A325-45C9-A490-16B6BCA8B71F}">
+  <ds:schemaRefs>
+    <ds:schemaRef ds:uri="http://schemas.microsoft.com/VisualStudio/2011/storyboarding/control"/>
+  </ds:schemaRefs>
+</ds:datastoreItem>
+</file>
+
+<file path=customXml/itemProps20.xml><?xml version="1.0" encoding="utf-8"?>
+<ds:datastoreItem xmlns:ds="http://schemas.openxmlformats.org/officeDocument/2006/customXml" ds:itemID="{888D7319-B23C-4FD6-8814-58CD6528C672}">
+  <ds:schemaRefs>
+    <ds:schemaRef ds:uri="http://schemas.microsoft.com/VisualStudio/2011/storyboarding/control"/>
+  </ds:schemaRefs>
+</ds:datastoreItem>
+</file>
+
+<file path=customXml/itemProps21.xml><?xml version="1.0" encoding="utf-8"?>
+<ds:datastoreItem xmlns:ds="http://schemas.openxmlformats.org/officeDocument/2006/customXml" ds:itemID="{EBE7D2B6-F1C5-4751-BCA9-78224F79779F}">
+  <ds:schemaRefs>
+    <ds:schemaRef ds:uri="http://schemas.microsoft.com/VisualStudio/2011/storyboarding/control"/>
+  </ds:schemaRefs>
+</ds:datastoreItem>
+</file>
+
+<file path=customXml/itemProps22.xml><?xml version="1.0" encoding="utf-8"?>
+<ds:datastoreItem xmlns:ds="http://schemas.openxmlformats.org/officeDocument/2006/customXml" ds:itemID="{DCD166D2-DF9D-490A-8D61-E66FB6C4566C}">
+  <ds:schemaRefs>
+    <ds:schemaRef ds:uri="http://schemas.microsoft.com/VisualStudio/2011/storyboarding/control"/>
+  </ds:schemaRefs>
+</ds:datastoreItem>
+</file>
+
+<file path=customXml/itemProps23.xml><?xml version="1.0" encoding="utf-8"?>
 <ds:datastoreItem xmlns:ds="http://schemas.openxmlformats.org/officeDocument/2006/customXml" ds:itemID="{8131C082-8AC0-43A7-95BF-31C4D6889FAB}">
   <ds:schemaRefs>
     <ds:schemaRef ds:uri="http://schemas.microsoft.com/VisualStudio/2011/storyboarding/control"/>
@@ -13994,15 +14099,199 @@
 </ds:datastoreItem>
 </file>
 
-<file path=customXml/itemProps11.xml><?xml version="1.0" encoding="utf-8"?>
-<ds:datastoreItem xmlns:ds="http://schemas.openxmlformats.org/officeDocument/2006/customXml" ds:itemID="{37FE8332-15AE-42AB-B658-6CA650AB87C9}">
+<file path=customXml/itemProps24.xml><?xml version="1.0" encoding="utf-8"?>
+<ds:datastoreItem xmlns:ds="http://schemas.openxmlformats.org/officeDocument/2006/customXml" ds:itemID="{363F6C48-1C65-46F0-BED4-1FA563841162}">
   <ds:schemaRefs>
     <ds:schemaRef ds:uri="http://schemas.microsoft.com/VisualStudio/2011/storyboarding/control"/>
   </ds:schemaRefs>
 </ds:datastoreItem>
 </file>
 
-<file path=customXml/itemProps12.xml><?xml version="1.0" encoding="utf-8"?>
+<file path=customXml/itemProps25.xml><?xml version="1.0" encoding="utf-8"?>
+<ds:datastoreItem xmlns:ds="http://schemas.openxmlformats.org/officeDocument/2006/customXml" ds:itemID="{F7672742-105B-4EDD-836D-3F441D984A62}">
+  <ds:schemaRefs>
+    <ds:schemaRef ds:uri="http://schemas.microsoft.com/VisualStudio/2011/storyboarding/control"/>
+  </ds:schemaRefs>
+</ds:datastoreItem>
+</file>
+
+<file path=customXml/itemProps26.xml><?xml version="1.0" encoding="utf-8"?>
+<ds:datastoreItem xmlns:ds="http://schemas.openxmlformats.org/officeDocument/2006/customXml" ds:itemID="{0A80EB47-FECF-4BB2-A379-A295C50BCEC2}">
+  <ds:schemaRefs>
+    <ds:schemaRef ds:uri="http://schemas.microsoft.com/VisualStudio/2011/storyboarding/control"/>
+  </ds:schemaRefs>
+</ds:datastoreItem>
+</file>
+
+<file path=customXml/itemProps27.xml><?xml version="1.0" encoding="utf-8"?>
+<ds:datastoreItem xmlns:ds="http://schemas.openxmlformats.org/officeDocument/2006/customXml" ds:itemID="{DB055F61-50D5-4F3E-9D0E-31D0C3A82C8B}">
+  <ds:schemaRefs>
+    <ds:schemaRef ds:uri="http://schemas.microsoft.com/VisualStudio/2011/storyboarding/control"/>
+  </ds:schemaRefs>
+</ds:datastoreItem>
+</file>
+
+<file path=customXml/itemProps28.xml><?xml version="1.0" encoding="utf-8"?>
+<ds:datastoreItem xmlns:ds="http://schemas.openxmlformats.org/officeDocument/2006/customXml" ds:itemID="{62C1AE7A-F593-4AFC-9940-8B9396F9330A}">
+  <ds:schemaRefs>
+    <ds:schemaRef ds:uri="http://schemas.microsoft.com/VisualStudio/2011/storyboarding/control"/>
+  </ds:schemaRefs>
+</ds:datastoreItem>
+</file>
+
+<file path=customXml/itemProps29.xml><?xml version="1.0" encoding="utf-8"?>
+<ds:datastoreItem xmlns:ds="http://schemas.openxmlformats.org/officeDocument/2006/customXml" ds:itemID="{39A9D6F8-BAFF-4234-B897-869A60312AC4}">
+  <ds:schemaRefs>
+    <ds:schemaRef ds:uri="http://schemas.microsoft.com/VisualStudio/2011/storyboarding/control"/>
+  </ds:schemaRefs>
+</ds:datastoreItem>
+</file>
+
+<file path=customXml/itemProps3.xml><?xml version="1.0" encoding="utf-8"?>
+<ds:datastoreItem xmlns:ds="http://schemas.openxmlformats.org/officeDocument/2006/customXml" ds:itemID="{869A052F-7AA3-48CF-B37E-9F2F55475F6A}">
+  <ds:schemaRefs>
+    <ds:schemaRef ds:uri="http://schemas.microsoft.com/VisualStudio/2011/storyboarding/control"/>
+  </ds:schemaRefs>
+</ds:datastoreItem>
+</file>
+
+<file path=customXml/itemProps30.xml><?xml version="1.0" encoding="utf-8"?>
+<ds:datastoreItem xmlns:ds="http://schemas.openxmlformats.org/officeDocument/2006/customXml" ds:itemID="{E57F9A53-6CA8-49C7-A565-51CED1F902E5}">
+  <ds:schemaRefs>
+    <ds:schemaRef ds:uri="http://schemas.microsoft.com/VisualStudio/2011/storyboarding/control"/>
+  </ds:schemaRefs>
+</ds:datastoreItem>
+</file>
+
+<file path=customXml/itemProps31.xml><?xml version="1.0" encoding="utf-8"?>
+<ds:datastoreItem xmlns:ds="http://schemas.openxmlformats.org/officeDocument/2006/customXml" ds:itemID="{E18FB959-9303-43FE-8E05-C5E316A9C43C}">
+  <ds:schemaRefs>
+    <ds:schemaRef ds:uri="http://schemas.microsoft.com/VisualStudio/2011/storyboarding/control"/>
+  </ds:schemaRefs>
+</ds:datastoreItem>
+</file>
+
+<file path=customXml/itemProps32.xml><?xml version="1.0" encoding="utf-8"?>
+<ds:datastoreItem xmlns:ds="http://schemas.openxmlformats.org/officeDocument/2006/customXml" ds:itemID="{8F7EFCB8-78E9-49C7-8AE1-1507F185ED8F}">
+  <ds:schemaRefs>
+    <ds:schemaRef ds:uri="http://schemas.microsoft.com/VisualStudio/2011/storyboarding/control"/>
+  </ds:schemaRefs>
+</ds:datastoreItem>
+</file>
+
+<file path=customXml/itemProps33.xml><?xml version="1.0" encoding="utf-8"?>
+<ds:datastoreItem xmlns:ds="http://schemas.openxmlformats.org/officeDocument/2006/customXml" ds:itemID="{B6E3F448-D34E-4994-8CCB-D0E016B327E1}">
+  <ds:schemaRefs>
+    <ds:schemaRef ds:uri="http://schemas.microsoft.com/VisualStudio/2011/storyboarding/control"/>
+  </ds:schemaRefs>
+</ds:datastoreItem>
+</file>
+
+<file path=customXml/itemProps34.xml><?xml version="1.0" encoding="utf-8"?>
+<ds:datastoreItem xmlns:ds="http://schemas.openxmlformats.org/officeDocument/2006/customXml" ds:itemID="{614FB6CF-2EEF-41C6-BA3C-CE3697AD49F4}">
+  <ds:schemaRefs>
+    <ds:schemaRef ds:uri="http://schemas.microsoft.com/VisualStudio/2011/storyboarding/control"/>
+  </ds:schemaRefs>
+</ds:datastoreItem>
+</file>
+
+<file path=customXml/itemProps35.xml><?xml version="1.0" encoding="utf-8"?>
+<ds:datastoreItem xmlns:ds="http://schemas.openxmlformats.org/officeDocument/2006/customXml" ds:itemID="{79F7387A-720F-4080-90A1-AE35649A27BC}">
+  <ds:schemaRefs>
+    <ds:schemaRef ds:uri="http://schemas.microsoft.com/VisualStudio/2011/storyboarding/control"/>
+  </ds:schemaRefs>
+</ds:datastoreItem>
+</file>
+
+<file path=customXml/itemProps36.xml><?xml version="1.0" encoding="utf-8"?>
+<ds:datastoreItem xmlns:ds="http://schemas.openxmlformats.org/officeDocument/2006/customXml" ds:itemID="{3B03A545-63C3-4900-AFA3-21C87CDF78E2}">
+  <ds:schemaRefs>
+    <ds:schemaRef ds:uri="http://schemas.microsoft.com/VisualStudio/2011/storyboarding/control"/>
+  </ds:schemaRefs>
+</ds:datastoreItem>
+</file>
+
+<file path=customXml/itemProps37.xml><?xml version="1.0" encoding="utf-8"?>
+<ds:datastoreItem xmlns:ds="http://schemas.openxmlformats.org/officeDocument/2006/customXml" ds:itemID="{028823D6-2941-4700-91F5-38924448BF93}">
+  <ds:schemaRefs>
+    <ds:schemaRef ds:uri="http://schemas.microsoft.com/VisualStudio/2011/storyboarding/control"/>
+  </ds:schemaRefs>
+</ds:datastoreItem>
+</file>
+
+<file path=customXml/itemProps38.xml><?xml version="1.0" encoding="utf-8"?>
+<ds:datastoreItem xmlns:ds="http://schemas.openxmlformats.org/officeDocument/2006/customXml" ds:itemID="{23EE2C33-3FB7-4956-B205-758C571E5672}">
+  <ds:schemaRefs>
+    <ds:schemaRef ds:uri="http://schemas.microsoft.com/VisualStudio/2011/storyboarding/control"/>
+  </ds:schemaRefs>
+</ds:datastoreItem>
+</file>
+
+<file path=customXml/itemProps39.xml><?xml version="1.0" encoding="utf-8"?>
+<ds:datastoreItem xmlns:ds="http://schemas.openxmlformats.org/officeDocument/2006/customXml" ds:itemID="{D095929A-96E0-42AA-8C75-5FCFF3F5A0A5}">
+  <ds:schemaRefs>
+    <ds:schemaRef ds:uri="http://schemas.microsoft.com/VisualStudio/2011/storyboarding/control"/>
+  </ds:schemaRefs>
+</ds:datastoreItem>
+</file>
+
+<file path=customXml/itemProps4.xml><?xml version="1.0" encoding="utf-8"?>
+<ds:datastoreItem xmlns:ds="http://schemas.openxmlformats.org/officeDocument/2006/customXml" ds:itemID="{F99BE8F6-6351-4BC3-9791-85F2EC01E882}">
+  <ds:schemaRefs>
+    <ds:schemaRef ds:uri="http://schemas.microsoft.com/VisualStudio/2011/storyboarding/control"/>
+  </ds:schemaRefs>
+</ds:datastoreItem>
+</file>
+
+<file path=customXml/itemProps40.xml><?xml version="1.0" encoding="utf-8"?>
+<ds:datastoreItem xmlns:ds="http://schemas.openxmlformats.org/officeDocument/2006/customXml" ds:itemID="{53D9FF8E-AA75-4A57-B6AF-96ABB2288E03}">
+  <ds:schemaRefs>
+    <ds:schemaRef ds:uri="http://schemas.microsoft.com/VisualStudio/2011/storyboarding/control"/>
+  </ds:schemaRefs>
+</ds:datastoreItem>
+</file>
+
+<file path=customXml/itemProps41.xml><?xml version="1.0" encoding="utf-8"?>
+<ds:datastoreItem xmlns:ds="http://schemas.openxmlformats.org/officeDocument/2006/customXml" ds:itemID="{49537C2A-341F-4DF4-9E6E-2D4CA9B3C7D4}">
+  <ds:schemaRefs>
+    <ds:schemaRef ds:uri="http://schemas.microsoft.com/VisualStudio/2011/storyboarding/control"/>
+  </ds:schemaRefs>
+</ds:datastoreItem>
+</file>
+
+<file path=customXml/itemProps42.xml><?xml version="1.0" encoding="utf-8"?>
+<ds:datastoreItem xmlns:ds="http://schemas.openxmlformats.org/officeDocument/2006/customXml" ds:itemID="{E7B2DC0D-E2A8-402E-8916-30061578DE94}">
+  <ds:schemaRefs>
+    <ds:schemaRef ds:uri="http://schemas.microsoft.com/VisualStudio/2011/storyboarding/control"/>
+  </ds:schemaRefs>
+</ds:datastoreItem>
+</file>
+
+<file path=customXml/itemProps43.xml><?xml version="1.0" encoding="utf-8"?>
+<ds:datastoreItem xmlns:ds="http://schemas.openxmlformats.org/officeDocument/2006/customXml" ds:itemID="{BFDDD1E5-6EE8-43FF-A326-D72E6AE35696}">
+  <ds:schemaRefs>
+    <ds:schemaRef ds:uri="http://schemas.microsoft.com/VisualStudio/2011/storyboarding/control"/>
+  </ds:schemaRefs>
+</ds:datastoreItem>
+</file>
+
+<file path=customXml/itemProps44.xml><?xml version="1.0" encoding="utf-8"?>
+<ds:datastoreItem xmlns:ds="http://schemas.openxmlformats.org/officeDocument/2006/customXml" ds:itemID="{97AC04A7-A312-4FE7-BD3C-AAD10B6A127C}">
+  <ds:schemaRefs>
+    <ds:schemaRef ds:uri="http://schemas.microsoft.com/VisualStudio/2011/storyboarding/control"/>
+  </ds:schemaRefs>
+</ds:datastoreItem>
+</file>
+
+<file path=customXml/itemProps45.xml><?xml version="1.0" encoding="utf-8"?>
+<ds:datastoreItem xmlns:ds="http://schemas.openxmlformats.org/officeDocument/2006/customXml" ds:itemID="{5383A712-1360-49D8-B822-6A8778800F3A}">
+  <ds:schemaRefs>
+    <ds:schemaRef ds:uri="http://schemas.microsoft.com/VisualStudio/2011/storyboarding/control"/>
+  </ds:schemaRefs>
+</ds:datastoreItem>
+</file>
+
+<file path=customXml/itemProps46.xml><?xml version="1.0" encoding="utf-8"?>
 <ds:datastoreItem xmlns:ds="http://schemas.openxmlformats.org/officeDocument/2006/customXml" ds:itemID="{4BB4F1BB-FA6F-4FE1-879D-988B2788852B}">
   <ds:schemaRefs>
     <ds:schemaRef ds:uri="http://schemas.microsoft.com/VisualStudio/2011/storyboarding/control"/>
@@ -14010,31 +14299,23 @@
 </ds:datastoreItem>
 </file>
 
-<file path=customXml/itemProps13.xml><?xml version="1.0" encoding="utf-8"?>
-<ds:datastoreItem xmlns:ds="http://schemas.openxmlformats.org/officeDocument/2006/customXml" ds:itemID="{028823D6-2941-4700-91F5-38924448BF93}">
+<file path=customXml/itemProps47.xml><?xml version="1.0" encoding="utf-8"?>
+<ds:datastoreItem xmlns:ds="http://schemas.openxmlformats.org/officeDocument/2006/customXml" ds:itemID="{34C1AE00-3D8A-491E-9699-D533C1701732}">
   <ds:schemaRefs>
     <ds:schemaRef ds:uri="http://schemas.microsoft.com/VisualStudio/2011/storyboarding/control"/>
   </ds:schemaRefs>
 </ds:datastoreItem>
 </file>
 
-<file path=customXml/itemProps14.xml><?xml version="1.0" encoding="utf-8"?>
-<ds:datastoreItem xmlns:ds="http://schemas.openxmlformats.org/officeDocument/2006/customXml" ds:itemID="{39A9D6F8-BAFF-4234-B897-869A60312AC4}">
+<file path=customXml/itemProps5.xml><?xml version="1.0" encoding="utf-8"?>
+<ds:datastoreItem xmlns:ds="http://schemas.openxmlformats.org/officeDocument/2006/customXml" ds:itemID="{729CB2F5-0508-4E91-9601-64296AA45CDD}">
   <ds:schemaRefs>
     <ds:schemaRef ds:uri="http://schemas.microsoft.com/VisualStudio/2011/storyboarding/control"/>
   </ds:schemaRefs>
 </ds:datastoreItem>
 </file>
 
-<file path=customXml/itemProps15.xml><?xml version="1.0" encoding="utf-8"?>
-<ds:datastoreItem xmlns:ds="http://schemas.openxmlformats.org/officeDocument/2006/customXml" ds:itemID="{2B7913F1-1AA3-45B3-BC9F-F7DB0444A344}">
-  <ds:schemaRefs>
-    <ds:schemaRef ds:uri="http://schemas.microsoft.com/VisualStudio/2011/storyboarding/control"/>
-  </ds:schemaRefs>
-</ds:datastoreItem>
-</file>
-
-<file path=customXml/itemProps16.xml><?xml version="1.0" encoding="utf-8"?>
+<file path=customXml/itemProps6.xml><?xml version="1.0" encoding="utf-8"?>
 <ds:datastoreItem xmlns:ds="http://schemas.openxmlformats.org/officeDocument/2006/customXml" ds:itemID="{621CBAAB-BD57-4F30-96D5-4619B9F2E8F6}">
   <ds:schemaRefs>
     <ds:schemaRef ds:uri="http://schemas.microsoft.com/VisualStudio/2011/storyboarding/control"/>
@@ -14042,39 +14323,7 @@
 </ds:datastoreItem>
 </file>
 
-<file path=customXml/itemProps17.xml><?xml version="1.0" encoding="utf-8"?>
-<ds:datastoreItem xmlns:ds="http://schemas.openxmlformats.org/officeDocument/2006/customXml" ds:itemID="{34C1AE00-3D8A-491E-9699-D533C1701732}">
-  <ds:schemaRefs>
-    <ds:schemaRef ds:uri="http://schemas.microsoft.com/VisualStudio/2011/storyboarding/control"/>
-  </ds:schemaRefs>
-</ds:datastoreItem>
-</file>
-
-<file path=customXml/itemProps18.xml><?xml version="1.0" encoding="utf-8"?>
-<ds:datastoreItem xmlns:ds="http://schemas.openxmlformats.org/officeDocument/2006/customXml" ds:itemID="{23EE2C33-3FB7-4956-B205-758C571E5672}">
-  <ds:schemaRefs>
-    <ds:schemaRef ds:uri="http://schemas.microsoft.com/VisualStudio/2011/storyboarding/control"/>
-  </ds:schemaRefs>
-</ds:datastoreItem>
-</file>
-
-<file path=customXml/itemProps19.xml><?xml version="1.0" encoding="utf-8"?>
-<ds:datastoreItem xmlns:ds="http://schemas.openxmlformats.org/officeDocument/2006/customXml" ds:itemID="{363F6C48-1C65-46F0-BED4-1FA563841162}">
-  <ds:schemaRefs>
-    <ds:schemaRef ds:uri="http://schemas.microsoft.com/VisualStudio/2011/storyboarding/control"/>
-  </ds:schemaRefs>
-</ds:datastoreItem>
-</file>
-
-<file path=customXml/itemProps2.xml><?xml version="1.0" encoding="utf-8"?>
-<ds:datastoreItem xmlns:ds="http://schemas.openxmlformats.org/officeDocument/2006/customXml" ds:itemID="{729CB2F5-0508-4E91-9601-64296AA45CDD}">
-  <ds:schemaRefs>
-    <ds:schemaRef ds:uri="http://schemas.microsoft.com/VisualStudio/2011/storyboarding/control"/>
-  </ds:schemaRefs>
-</ds:datastoreItem>
-</file>
-
-<file path=customXml/itemProps20.xml><?xml version="1.0" encoding="utf-8"?>
+<file path=customXml/itemProps7.xml><?xml version="1.0" encoding="utf-8"?>
 <ds:datastoreItem xmlns:ds="http://schemas.openxmlformats.org/officeDocument/2006/customXml" ds:itemID="{BE0E1101-E2AE-48BE-9D0B-AE425D1083C5}">
   <ds:schemaRefs>
     <ds:schemaRef ds:uri="http://schemas.microsoft.com/VisualStudio/2011/storyboarding/control"/>
@@ -14082,71 +14331,7 @@
 </ds:datastoreItem>
 </file>
 
-<file path=customXml/itemProps21.xml><?xml version="1.0" encoding="utf-8"?>
-<ds:datastoreItem xmlns:ds="http://schemas.openxmlformats.org/officeDocument/2006/customXml" ds:itemID="{49537C2A-341F-4DF4-9E6E-2D4CA9B3C7D4}">
-  <ds:schemaRefs>
-    <ds:schemaRef ds:uri="http://schemas.microsoft.com/VisualStudio/2011/storyboarding/control"/>
-  </ds:schemaRefs>
-</ds:datastoreItem>
-</file>
-
-<file path=customXml/itemProps22.xml><?xml version="1.0" encoding="utf-8"?>
-<ds:datastoreItem xmlns:ds="http://schemas.openxmlformats.org/officeDocument/2006/customXml" ds:itemID="{E57F9A53-6CA8-49C7-A565-51CED1F902E5}">
-  <ds:schemaRefs>
-    <ds:schemaRef ds:uri="http://schemas.microsoft.com/VisualStudio/2011/storyboarding/control"/>
-  </ds:schemaRefs>
-</ds:datastoreItem>
-</file>
-
-<file path=customXml/itemProps23.xml><?xml version="1.0" encoding="utf-8"?>
-<ds:datastoreItem xmlns:ds="http://schemas.openxmlformats.org/officeDocument/2006/customXml" ds:itemID="{888D7319-B23C-4FD6-8814-58CD6528C672}">
-  <ds:schemaRefs>
-    <ds:schemaRef ds:uri="http://schemas.microsoft.com/VisualStudio/2011/storyboarding/control"/>
-  </ds:schemaRefs>
-</ds:datastoreItem>
-</file>
-
-<file path=customXml/itemProps24.xml><?xml version="1.0" encoding="utf-8"?>
-<ds:datastoreItem xmlns:ds="http://schemas.openxmlformats.org/officeDocument/2006/customXml" ds:itemID="{99C67ED5-9855-430E-A3A4-0E30BEB0D024}">
-  <ds:schemaRefs>
-    <ds:schemaRef ds:uri="http://schemas.microsoft.com/VisualStudio/2011/storyboarding/control"/>
-  </ds:schemaRefs>
-</ds:datastoreItem>
-</file>
-
-<file path=customXml/itemProps25.xml><?xml version="1.0" encoding="utf-8"?>
-<ds:datastoreItem xmlns:ds="http://schemas.openxmlformats.org/officeDocument/2006/customXml" ds:itemID="{F7171423-D758-4661-A1CD-668A1B96AFB8}">
-  <ds:schemaRefs>
-    <ds:schemaRef ds:uri="http://schemas.microsoft.com/VisualStudio/2011/storyboarding/control"/>
-  </ds:schemaRefs>
-</ds:datastoreItem>
-</file>
-
-<file path=customXml/itemProps26.xml><?xml version="1.0" encoding="utf-8"?>
-<ds:datastoreItem xmlns:ds="http://schemas.openxmlformats.org/officeDocument/2006/customXml" ds:itemID="{D095929A-96E0-42AA-8C75-5FCFF3F5A0A5}">
-  <ds:schemaRefs>
-    <ds:schemaRef ds:uri="http://schemas.microsoft.com/VisualStudio/2011/storyboarding/control"/>
-  </ds:schemaRefs>
-</ds:datastoreItem>
-</file>
-
-<file path=customXml/itemProps27.xml><?xml version="1.0" encoding="utf-8"?>
-<ds:datastoreItem xmlns:ds="http://schemas.openxmlformats.org/officeDocument/2006/customXml" ds:itemID="{E18FB959-9303-43FE-8E05-C5E316A9C43C}">
-  <ds:schemaRefs>
-    <ds:schemaRef ds:uri="http://schemas.microsoft.com/VisualStudio/2011/storyboarding/control"/>
-  </ds:schemaRefs>
-</ds:datastoreItem>
-</file>
-
-<file path=customXml/itemProps28.xml><?xml version="1.0" encoding="utf-8"?>
-<ds:datastoreItem xmlns:ds="http://schemas.openxmlformats.org/officeDocument/2006/customXml" ds:itemID="{EBE7D2B6-F1C5-4751-BCA9-78224F79779F}">
-  <ds:schemaRefs>
-    <ds:schemaRef ds:uri="http://schemas.microsoft.com/VisualStudio/2011/storyboarding/control"/>
-  </ds:schemaRefs>
-</ds:datastoreItem>
-</file>
-
-<file path=customXml/itemProps29.xml><?xml version="1.0" encoding="utf-8"?>
+<file path=customXml/itemProps8.xml><?xml version="1.0" encoding="utf-8"?>
 <ds:datastoreItem xmlns:ds="http://schemas.openxmlformats.org/officeDocument/2006/customXml" ds:itemID="{709B4058-9130-4EBC-80FE-85096BCD3B4F}">
   <ds:schemaRefs>
     <ds:schemaRef ds:uri="http://schemas.microsoft.com/VisualStudio/2011/storyboarding/control"/>
@@ -14154,202 +14339,10 @@
 </ds:datastoreItem>
 </file>
 
-<file path=customXml/itemProps3.xml><?xml version="1.0" encoding="utf-8"?>
-<ds:datastoreItem xmlns:ds="http://schemas.openxmlformats.org/officeDocument/2006/customXml" ds:itemID="{3B03A545-63C3-4900-AFA3-21C87CDF78E2}">
-  <ds:schemaRefs>
-    <ds:schemaRef ds:uri="http://schemas.microsoft.com/VisualStudio/2011/storyboarding/control"/>
-  </ds:schemaRefs>
-</ds:datastoreItem>
-</file>
-
-<file path=customXml/itemProps30.xml><?xml version="1.0" encoding="utf-8"?>
-<ds:datastoreItem xmlns:ds="http://schemas.openxmlformats.org/officeDocument/2006/customXml" ds:itemID="{8F7EFCB8-78E9-49C7-8AE1-1507F185ED8F}">
-  <ds:schemaRefs>
-    <ds:schemaRef ds:uri="http://schemas.microsoft.com/VisualStudio/2011/storyboarding/control"/>
-  </ds:schemaRefs>
-</ds:datastoreItem>
-</file>
-
-<file path=customXml/itemProps31.xml><?xml version="1.0" encoding="utf-8"?>
-<ds:datastoreItem xmlns:ds="http://schemas.openxmlformats.org/officeDocument/2006/customXml" ds:itemID="{F7672742-105B-4EDD-836D-3F441D984A62}">
-  <ds:schemaRefs>
-    <ds:schemaRef ds:uri="http://schemas.microsoft.com/VisualStudio/2011/storyboarding/control"/>
-  </ds:schemaRefs>
-</ds:datastoreItem>
-</file>
-
-<file path=customXml/itemProps32.xml><?xml version="1.0" encoding="utf-8"?>
-<ds:datastoreItem xmlns:ds="http://schemas.openxmlformats.org/officeDocument/2006/customXml" ds:itemID="{F9465E2D-3DCD-4B6E-83BF-F9A530097531}">
-  <ds:schemaRefs>
-    <ds:schemaRef ds:uri="http://schemas.microsoft.com/VisualStudio/2011/storyboarding/control"/>
-  </ds:schemaRefs>
-</ds:datastoreItem>
-</file>
-
-<file path=customXml/itemProps33.xml><?xml version="1.0" encoding="utf-8"?>
-<ds:datastoreItem xmlns:ds="http://schemas.openxmlformats.org/officeDocument/2006/customXml" ds:itemID="{54E314B1-A325-45C9-A490-16B6BCA8B71F}">
-  <ds:schemaRefs>
-    <ds:schemaRef ds:uri="http://schemas.microsoft.com/VisualStudio/2011/storyboarding/control"/>
-  </ds:schemaRefs>
-</ds:datastoreItem>
-</file>
-
-<file path=customXml/itemProps34.xml><?xml version="1.0" encoding="utf-8"?>
-<ds:datastoreItem xmlns:ds="http://schemas.openxmlformats.org/officeDocument/2006/customXml" ds:itemID="{E7B2DC0D-E2A8-402E-8916-30061578DE94}">
-  <ds:schemaRefs>
-    <ds:schemaRef ds:uri="http://schemas.microsoft.com/VisualStudio/2011/storyboarding/control"/>
-  </ds:schemaRefs>
-</ds:datastoreItem>
-</file>
-
-<file path=customXml/itemProps35.xml><?xml version="1.0" encoding="utf-8"?>
-<ds:datastoreItem xmlns:ds="http://schemas.openxmlformats.org/officeDocument/2006/customXml" ds:itemID="{B6E3F448-D34E-4994-8CCB-D0E016B327E1}">
-  <ds:schemaRefs>
-    <ds:schemaRef ds:uri="http://schemas.microsoft.com/VisualStudio/2011/storyboarding/control"/>
-  </ds:schemaRefs>
-</ds:datastoreItem>
-</file>
-
-<file path=customXml/itemProps36.xml><?xml version="1.0" encoding="utf-8"?>
-<ds:datastoreItem xmlns:ds="http://schemas.openxmlformats.org/officeDocument/2006/customXml" ds:itemID="{DCD166D2-DF9D-490A-8D61-E66FB6C4566C}">
-  <ds:schemaRefs>
-    <ds:schemaRef ds:uri="http://schemas.microsoft.com/VisualStudio/2011/storyboarding/control"/>
-  </ds:schemaRefs>
-</ds:datastoreItem>
-</file>
-
-<file path=customXml/itemProps37.xml><?xml version="1.0" encoding="utf-8"?>
-<ds:datastoreItem xmlns:ds="http://schemas.openxmlformats.org/officeDocument/2006/customXml" ds:itemID="{EA9F5074-9F3D-4DB7-8B97-43B1B2E60445}">
-  <ds:schemaRefs>
-    <ds:schemaRef ds:uri="http://schemas.microsoft.com/VisualStudio/2011/storyboarding/control"/>
-  </ds:schemaRefs>
-</ds:datastoreItem>
-</file>
-
-<file path=customXml/itemProps38.xml><?xml version="1.0" encoding="utf-8"?>
-<ds:datastoreItem xmlns:ds="http://schemas.openxmlformats.org/officeDocument/2006/customXml" ds:itemID="{869A052F-7AA3-48CF-B37E-9F2F55475F6A}">
-  <ds:schemaRefs>
-    <ds:schemaRef ds:uri="http://schemas.microsoft.com/VisualStudio/2011/storyboarding/control"/>
-  </ds:schemaRefs>
-</ds:datastoreItem>
-</file>
-
-<file path=customXml/itemProps39.xml><?xml version="1.0" encoding="utf-8"?>
-<ds:datastoreItem xmlns:ds="http://schemas.openxmlformats.org/officeDocument/2006/customXml" ds:itemID="{53D9FF8E-AA75-4A57-B6AF-96ABB2288E03}">
-  <ds:schemaRefs>
-    <ds:schemaRef ds:uri="http://schemas.microsoft.com/VisualStudio/2011/storyboarding/control"/>
-  </ds:schemaRefs>
-</ds:datastoreItem>
-</file>
-
-<file path=customXml/itemProps4.xml><?xml version="1.0" encoding="utf-8"?>
-<ds:datastoreItem xmlns:ds="http://schemas.openxmlformats.org/officeDocument/2006/customXml" ds:itemID="{DB055F61-50D5-4F3E-9D0E-31D0C3A82C8B}">
-  <ds:schemaRefs>
-    <ds:schemaRef ds:uri="http://schemas.microsoft.com/VisualStudio/2011/storyboarding/control"/>
-  </ds:schemaRefs>
-</ds:datastoreItem>
-</file>
-
-<file path=customXml/itemProps40.xml><?xml version="1.0" encoding="utf-8"?>
-<ds:datastoreItem xmlns:ds="http://schemas.openxmlformats.org/officeDocument/2006/customXml" ds:itemID="{699FD775-CD87-43C7-BED3-C99D7D1D0F44}">
-  <ds:schemaRefs>
-    <ds:schemaRef ds:uri="http://schemas.microsoft.com/VisualStudio/2011/storyboarding/control"/>
-  </ds:schemaRefs>
-</ds:datastoreItem>
-</file>
-
-<file path=customXml/itemProps41.xml><?xml version="1.0" encoding="utf-8"?>
+<file path=customXml/itemProps9.xml><?xml version="1.0" encoding="utf-8"?>
 <ds:datastoreItem xmlns:ds="http://schemas.openxmlformats.org/officeDocument/2006/customXml" ds:itemID="{9EEE4458-FB40-4680-AD3B-7918F0F3E4C3}">
   <ds:schemaRefs>
     <ds:schemaRef ds:uri="http://schemas.microsoft.com/VisualStudio/2011/storyboarding/control"/>
   </ds:schemaRefs>
 </ds:datastoreItem>
-</file>
-
-<file path=customXml/itemProps42.xml><?xml version="1.0" encoding="utf-8"?>
-<ds:datastoreItem xmlns:ds="http://schemas.openxmlformats.org/officeDocument/2006/customXml" ds:itemID="{BFDDD1E5-6EE8-43FF-A326-D72E6AE35696}">
-  <ds:schemaRefs>
-    <ds:schemaRef ds:uri="http://schemas.microsoft.com/VisualStudio/2011/storyboarding/control"/>
-  </ds:schemaRefs>
-</ds:datastoreItem>
-</file>
-
-<file path=customXml/itemProps43.xml><?xml version="1.0" encoding="utf-8"?>
-<ds:datastoreItem xmlns:ds="http://schemas.openxmlformats.org/officeDocument/2006/customXml" ds:itemID="{614FB6CF-2EEF-41C6-BA3C-CE3697AD49F4}">
-  <ds:schemaRefs>
-    <ds:schemaRef ds:uri="http://schemas.microsoft.com/VisualStudio/2011/storyboarding/control"/>
-  </ds:schemaRefs>
-</ds:datastoreItem>
-</file>
-
-<file path=customXml/itemProps44.xml><?xml version="1.0" encoding="utf-8"?>
-<ds:datastoreItem xmlns:ds="http://schemas.openxmlformats.org/officeDocument/2006/customXml" ds:itemID="{0A80EB47-FECF-4BB2-A379-A295C50BCEC2}">
-  <ds:schemaRefs>
-    <ds:schemaRef ds:uri="http://schemas.microsoft.com/VisualStudio/2011/storyboarding/control"/>
-  </ds:schemaRefs>
-</ds:datastoreItem>
-</file>
-
-<file path=customXml/itemProps45.xml><?xml version="1.0" encoding="utf-8"?>
-<ds:datastoreItem xmlns:ds="http://schemas.openxmlformats.org/officeDocument/2006/customXml" ds:itemID="{B6C0F96A-AED6-437F-A71B-DE5297FACAE5}">
-  <ds:schemaRefs>
-    <ds:schemaRef ds:uri="http://schemas.microsoft.com/VisualStudio/2011/storyboarding/control"/>
-  </ds:schemaRefs>
-</ds:datastoreItem>
-</file>
-
-<file path=customXml/itemProps46.xml><?xml version="1.0" encoding="utf-8"?>
-<ds:datastoreItem xmlns:ds="http://schemas.openxmlformats.org/officeDocument/2006/customXml" ds:itemID="{F99BE8F6-6351-4BC3-9791-85F2EC01E882}">
-  <ds:schemaRefs>
-    <ds:schemaRef ds:uri="http://schemas.microsoft.com/VisualStudio/2011/storyboarding/control"/>
-  </ds:schemaRefs>
-</ds:datastoreItem>
-</file>
-
-<file path=customXml/itemProps47.xml><?xml version="1.0" encoding="utf-8"?>
-<ds:datastoreItem xmlns:ds="http://schemas.openxmlformats.org/officeDocument/2006/customXml" ds:itemID="{97AC04A7-A312-4FE7-BD3C-AAD10B6A127C}">
-  <ds:schemaRefs>
-    <ds:schemaRef ds:uri="http://schemas.microsoft.com/VisualStudio/2011/storyboarding/control"/>
-  </ds:schemaRefs>
-</ds:datastoreItem>
-</file>
-
-<file path=customXml/itemProps5.xml><?xml version="1.0" encoding="utf-8"?>
-<ds:datastoreItem xmlns:ds="http://schemas.openxmlformats.org/officeDocument/2006/customXml" ds:itemID="{E108BEC3-0795-4CAB-9EF4-D252AF70CF15}">
-  <ds:schemaRefs>
-    <ds:schemaRef ds:uri="http://schemas.microsoft.com/VisualStudio/2011/storyboarding/control"/>
-  </ds:schemaRefs>
-</ds:datastoreItem>
-</file>
-
-<file path=customXml/itemProps6.xml><?xml version="1.0" encoding="utf-8"?>
-<ds:datastoreItem xmlns:ds="http://schemas.openxmlformats.org/officeDocument/2006/customXml" ds:itemID="{70E72DF6-3694-4E6B-B583-2E6362F2B9A9}">
-  <ds:schemaRefs>
-    <ds:schemaRef ds:uri="http://schemas.microsoft.com/VisualStudio/2011/storyboarding/control"/>
-  </ds:schemaRefs>
-</ds:datastoreItem>
-</file>
-
-<file path=customXml/itemProps7.xml><?xml version="1.0" encoding="utf-8"?>
-<ds:datastoreItem xmlns:ds="http://schemas.openxmlformats.org/officeDocument/2006/customXml" ds:itemID="{5383A712-1360-49D8-B822-6A8778800F3A}">
-  <ds:schemaRefs>
-    <ds:schemaRef ds:uri="http://schemas.microsoft.com/VisualStudio/2011/storyboarding/control"/>
-  </ds:schemaRefs>
-</ds:datastoreItem>
-</file>
-
-<file path=customXml/itemProps8.xml><?xml version="1.0" encoding="utf-8"?>
-<ds:datastoreItem xmlns:ds="http://schemas.openxmlformats.org/officeDocument/2006/customXml" ds:itemID="{79F7387A-720F-4080-90A1-AE35649A27BC}">
-  <ds:schemaRefs>
-    <ds:schemaRef ds:uri="http://schemas.microsoft.com/VisualStudio/2011/storyboarding/control"/>
-  </ds:schemaRefs>
-</ds:datastoreItem>
-</file>
-
-<file path=customXml/itemProps9.xml><?xml version="1.0" encoding="utf-8"?>
-<ds:datastoreItem xmlns:ds="http://schemas.openxmlformats.org/officeDocument/2006/customXml" ds:itemID="{62C1AE7A-F593-4AFC-9940-8B9396F9330A}">
-  <ds:schemaRefs>
-    <ds:schemaRef ds:uri="http://schemas.microsoft.com/VisualStudio/2011/storyboarding/control"/>
-  </ds:schemaRefs>
-</ds:datastoreItem>
 </file>
</xml_diff>

<commit_message>
Full homescreen template done. Meal cards to be added next
</commit_message>
<xml_diff>
--- a/lifefitppt.pptx
+++ b/lifefitppt.pptx
@@ -622,7 +622,9 @@
               <c:showPercent val="1"/>
               <c:showBubbleSize val="0"/>
               <c:extLst>
-                <c:ext xmlns:c15="http://schemas.microsoft.com/office/drawing/2012/chart" uri="{CE6537A1-D6FC-4f65-9D91-7224C49458BB}"/>
+                <c:ext xmlns:c15="http://schemas.microsoft.com/office/drawing/2012/chart" uri="{CE6537A1-D6FC-4f65-9D91-7224C49458BB}">
+                  <c15:layout/>
+                </c:ext>
                 <c:ext xmlns:c16="http://schemas.microsoft.com/office/drawing/2014/chart" uri="{C3380CC4-5D6E-409C-BE32-E72D297353CC}">
                   <c16:uniqueId val="{00000001-029C-44DD-BCCB-51996A254BEF}"/>
                 </c:ext>
@@ -644,7 +646,9 @@
               <c:showPercent val="1"/>
               <c:showBubbleSize val="0"/>
               <c:extLst>
-                <c:ext xmlns:c15="http://schemas.microsoft.com/office/drawing/2012/chart" uri="{CE6537A1-D6FC-4f65-9D91-7224C49458BB}"/>
+                <c:ext xmlns:c15="http://schemas.microsoft.com/office/drawing/2012/chart" uri="{CE6537A1-D6FC-4f65-9D91-7224C49458BB}">
+                  <c15:layout/>
+                </c:ext>
                 <c:ext xmlns:c16="http://schemas.microsoft.com/office/drawing/2014/chart" uri="{C3380CC4-5D6E-409C-BE32-E72D297353CC}">
                   <c16:uniqueId val="{00000003-029C-44DD-BCCB-51996A254BEF}"/>
                 </c:ext>
@@ -666,7 +670,9 @@
               <c:showPercent val="1"/>
               <c:showBubbleSize val="0"/>
               <c:extLst>
-                <c:ext xmlns:c15="http://schemas.microsoft.com/office/drawing/2012/chart" uri="{CE6537A1-D6FC-4f65-9D91-7224C49458BB}"/>
+                <c:ext xmlns:c15="http://schemas.microsoft.com/office/drawing/2012/chart" uri="{CE6537A1-D6FC-4f65-9D91-7224C49458BB}">
+                  <c15:layout/>
+                </c:ext>
                 <c:ext xmlns:c16="http://schemas.microsoft.com/office/drawing/2014/chart" uri="{C3380CC4-5D6E-409C-BE32-E72D297353CC}">
                   <c16:uniqueId val="{00000005-029C-44DD-BCCB-51996A254BEF}"/>
                 </c:ext>
@@ -792,6 +798,7 @@
     </c:plotArea>
     <c:legend>
       <c:legendPos val="r"/>
+      <c:layout/>
       <c:overlay val="0"/>
       <c:spPr>
         <a:solidFill>
@@ -2284,7 +2291,7 @@
           <a:p>
             <a:fld id="{5D4E30EF-97C9-4B63-B159-127690AB68C9}" type="datetimeFigureOut">
               <a:rPr lang="en-US" smtClean="0"/>
-              <a:t>7/28/2015</a:t>
+              <a:t>7/29/2015</a:t>
             </a:fld>
             <a:endParaRPr lang="en-US"/>
           </a:p>
@@ -2454,7 +2461,7 @@
           <a:p>
             <a:fld id="{5D4E30EF-97C9-4B63-B159-127690AB68C9}" type="datetimeFigureOut">
               <a:rPr lang="en-US" smtClean="0"/>
-              <a:t>7/28/2015</a:t>
+              <a:t>7/29/2015</a:t>
             </a:fld>
             <a:endParaRPr lang="en-US"/>
           </a:p>
@@ -2634,7 +2641,7 @@
           <a:p>
             <a:fld id="{5D4E30EF-97C9-4B63-B159-127690AB68C9}" type="datetimeFigureOut">
               <a:rPr lang="en-US" smtClean="0"/>
-              <a:t>7/28/2015</a:t>
+              <a:t>7/29/2015</a:t>
             </a:fld>
             <a:endParaRPr lang="en-US"/>
           </a:p>
@@ -2893,7 +2900,7 @@
           <a:p>
             <a:fld id="{C764DE79-268F-4C1A-8933-263129D2AF90}" type="datetimeFigureOut">
               <a:rPr lang="en-US" dirty="0"/>
-              <a:t>7/28/2015</a:t>
+              <a:t>7/29/2015</a:t>
             </a:fld>
             <a:endParaRPr lang="en-US" dirty="0"/>
           </a:p>
@@ -3063,7 +3070,7 @@
           <a:p>
             <a:fld id="{C764DE79-268F-4C1A-8933-263129D2AF90}" type="datetimeFigureOut">
               <a:rPr lang="en-US" dirty="0"/>
-              <a:t>7/28/2015</a:t>
+              <a:t>7/29/2015</a:t>
             </a:fld>
             <a:endParaRPr lang="en-US" dirty="0"/>
           </a:p>
@@ -3307,7 +3314,7 @@
           <a:p>
             <a:fld id="{C764DE79-268F-4C1A-8933-263129D2AF90}" type="datetimeFigureOut">
               <a:rPr lang="en-US" dirty="0"/>
-              <a:t>7/28/2015</a:t>
+              <a:t>7/29/2015</a:t>
             </a:fld>
             <a:endParaRPr lang="en-US" dirty="0"/>
           </a:p>
@@ -3539,7 +3546,7 @@
           <a:p>
             <a:fld id="{C764DE79-268F-4C1A-8933-263129D2AF90}" type="datetimeFigureOut">
               <a:rPr lang="en-US" dirty="0"/>
-              <a:t>7/28/2015</a:t>
+              <a:t>7/29/2015</a:t>
             </a:fld>
             <a:endParaRPr lang="en-US" dirty="0"/>
           </a:p>
@@ -3906,7 +3913,7 @@
           <a:p>
             <a:fld id="{C764DE79-268F-4C1A-8933-263129D2AF90}" type="datetimeFigureOut">
               <a:rPr lang="en-US" dirty="0"/>
-              <a:t>7/28/2015</a:t>
+              <a:t>7/29/2015</a:t>
             </a:fld>
             <a:endParaRPr lang="en-US" dirty="0"/>
           </a:p>
@@ -4024,7 +4031,7 @@
           <a:p>
             <a:fld id="{C764DE79-268F-4C1A-8933-263129D2AF90}" type="datetimeFigureOut">
               <a:rPr lang="en-US" dirty="0"/>
-              <a:t>7/28/2015</a:t>
+              <a:t>7/29/2015</a:t>
             </a:fld>
             <a:endParaRPr lang="en-US" dirty="0"/>
           </a:p>
@@ -4194,7 +4201,7 @@
           <a:p>
             <a:fld id="{5D4E30EF-97C9-4B63-B159-127690AB68C9}" type="datetimeFigureOut">
               <a:rPr lang="en-US" smtClean="0"/>
-              <a:t>7/28/2015</a:t>
+              <a:t>7/29/2015</a:t>
             </a:fld>
             <a:endParaRPr lang="en-US"/>
           </a:p>
@@ -4289,7 +4296,7 @@
           <a:p>
             <a:fld id="{C764DE79-268F-4C1A-8933-263129D2AF90}" type="datetimeFigureOut">
               <a:rPr lang="en-US" dirty="0"/>
-              <a:t>7/28/2015</a:t>
+              <a:t>7/29/2015</a:t>
             </a:fld>
             <a:endParaRPr lang="en-US" dirty="0"/>
           </a:p>
@@ -4566,7 +4573,7 @@
           <a:p>
             <a:fld id="{C764DE79-268F-4C1A-8933-263129D2AF90}" type="datetimeFigureOut">
               <a:rPr lang="en-US" dirty="0"/>
-              <a:t>7/28/2015</a:t>
+              <a:t>7/29/2015</a:t>
             </a:fld>
             <a:endParaRPr lang="en-US" dirty="0"/>
           </a:p>
@@ -4823,7 +4830,7 @@
           <a:p>
             <a:fld id="{C764DE79-268F-4C1A-8933-263129D2AF90}" type="datetimeFigureOut">
               <a:rPr lang="en-US" dirty="0"/>
-              <a:t>7/28/2015</a:t>
+              <a:t>7/29/2015</a:t>
             </a:fld>
             <a:endParaRPr lang="en-US" dirty="0"/>
           </a:p>
@@ -4993,7 +5000,7 @@
           <a:p>
             <a:fld id="{C764DE79-268F-4C1A-8933-263129D2AF90}" type="datetimeFigureOut">
               <a:rPr lang="en-US" dirty="0"/>
-              <a:t>7/28/2015</a:t>
+              <a:t>7/29/2015</a:t>
             </a:fld>
             <a:endParaRPr lang="en-US" dirty="0"/>
           </a:p>
@@ -5173,7 +5180,7 @@
           <a:p>
             <a:fld id="{C764DE79-268F-4C1A-8933-263129D2AF90}" type="datetimeFigureOut">
               <a:rPr lang="en-US" dirty="0"/>
-              <a:t>7/28/2015</a:t>
+              <a:t>7/29/2015</a:t>
             </a:fld>
             <a:endParaRPr lang="en-US" dirty="0"/>
           </a:p>
@@ -5456,7 +5463,7 @@
           <a:p>
             <a:fld id="{5D4E30EF-97C9-4B63-B159-127690AB68C9}" type="datetimeFigureOut">
               <a:rPr lang="en-US" smtClean="0"/>
-              <a:t>7/28/2015</a:t>
+              <a:t>7/29/2015</a:t>
             </a:fld>
             <a:endParaRPr lang="en-US"/>
           </a:p>
@@ -5688,7 +5695,7 @@
           <a:p>
             <a:fld id="{5D4E30EF-97C9-4B63-B159-127690AB68C9}" type="datetimeFigureOut">
               <a:rPr lang="en-US" smtClean="0"/>
-              <a:t>7/28/2015</a:t>
+              <a:t>7/29/2015</a:t>
             </a:fld>
             <a:endParaRPr lang="en-US"/>
           </a:p>
@@ -6055,7 +6062,7 @@
           <a:p>
             <a:fld id="{5D4E30EF-97C9-4B63-B159-127690AB68C9}" type="datetimeFigureOut">
               <a:rPr lang="en-US" smtClean="0"/>
-              <a:t>7/28/2015</a:t>
+              <a:t>7/29/2015</a:t>
             </a:fld>
             <a:endParaRPr lang="en-US"/>
           </a:p>
@@ -6173,7 +6180,7 @@
           <a:p>
             <a:fld id="{5D4E30EF-97C9-4B63-B159-127690AB68C9}" type="datetimeFigureOut">
               <a:rPr lang="en-US" smtClean="0"/>
-              <a:t>7/28/2015</a:t>
+              <a:t>7/29/2015</a:t>
             </a:fld>
             <a:endParaRPr lang="en-US"/>
           </a:p>
@@ -6268,7 +6275,7 @@
           <a:p>
             <a:fld id="{5D4E30EF-97C9-4B63-B159-127690AB68C9}" type="datetimeFigureOut">
               <a:rPr lang="en-US" smtClean="0"/>
-              <a:t>7/28/2015</a:t>
+              <a:t>7/29/2015</a:t>
             </a:fld>
             <a:endParaRPr lang="en-US"/>
           </a:p>
@@ -6545,7 +6552,7 @@
           <a:p>
             <a:fld id="{5D4E30EF-97C9-4B63-B159-127690AB68C9}" type="datetimeFigureOut">
               <a:rPr lang="en-US" smtClean="0"/>
-              <a:t>7/28/2015</a:t>
+              <a:t>7/29/2015</a:t>
             </a:fld>
             <a:endParaRPr lang="en-US"/>
           </a:p>
@@ -6802,7 +6809,7 @@
           <a:p>
             <a:fld id="{5D4E30EF-97C9-4B63-B159-127690AB68C9}" type="datetimeFigureOut">
               <a:rPr lang="en-US" smtClean="0"/>
-              <a:t>7/28/2015</a:t>
+              <a:t>7/29/2015</a:t>
             </a:fld>
             <a:endParaRPr lang="en-US"/>
           </a:p>
@@ -7015,7 +7022,7 @@
           <a:p>
             <a:fld id="{5D4E30EF-97C9-4B63-B159-127690AB68C9}" type="datetimeFigureOut">
               <a:rPr lang="en-US" smtClean="0"/>
-              <a:t>7/28/2015</a:t>
+              <a:t>7/29/2015</a:t>
             </a:fld>
             <a:endParaRPr lang="en-US"/>
           </a:p>
@@ -7872,7 +7879,7 @@
           <a:p>
             <a:fld id="{5D4E30EF-97C9-4B63-B159-127690AB68C9}" type="datetimeFigureOut">
               <a:rPr lang="en-US" smtClean="0"/>
-              <a:t>7/28/2015</a:t>
+              <a:t>7/29/2015</a:t>
             </a:fld>
             <a:endParaRPr lang="en-US"/>
           </a:p>
@@ -8280,22 +8287,20 @@
       </p:grpSpPr>
       <p:sp>
         <p:nvSpPr>
-          <p:cNvPr id="35" name="Rectangle 34"/>
+          <p:cNvPr id="36" name="Rectangle 35"/>
           <p:cNvSpPr/>
           <p:nvPr/>
         </p:nvSpPr>
         <p:spPr>
           <a:xfrm>
-            <a:off x="-4427" y="178407"/>
+            <a:off x="2247" y="181969"/>
             <a:ext cx="3282950" cy="366695"/>
           </a:xfrm>
           <a:prstGeom prst="rect">
             <a:avLst/>
           </a:prstGeom>
           <a:solidFill>
-            <a:srgbClr val="0DC3E7">
-              <a:alpha val="74902"/>
-            </a:srgbClr>
+            <a:srgbClr val="1FC7E9"/>
           </a:solidFill>
           <a:ln w="12700" cap="flat" cmpd="sng" algn="ctr">
             <a:noFill/>
@@ -9793,7 +9798,7 @@
       </p:grpSpPr>
       <p:sp>
         <p:nvSpPr>
-          <p:cNvPr id="37" name="Rectangle 36"/>
+          <p:cNvPr id="35" name="Rectangle 34"/>
           <p:cNvSpPr/>
           <p:nvPr/>
         </p:nvSpPr>
@@ -9806,9 +9811,7 @@
             <a:avLst/>
           </a:prstGeom>
           <a:solidFill>
-            <a:srgbClr val="0DC3E7">
-              <a:alpha val="74902"/>
-            </a:srgbClr>
+            <a:srgbClr val="1FC7E9"/>
           </a:solidFill>
           <a:ln w="12700" cap="flat" cmpd="sng" algn="ctr">
             <a:noFill/>
@@ -11292,14 +11295,14 @@
         </p:nvSpPr>
         <p:spPr>
           <a:xfrm>
-            <a:off x="2386822" y="783685"/>
+            <a:off x="2386822" y="801613"/>
             <a:ext cx="303650" cy="289884"/>
           </a:xfrm>
           <a:prstGeom prst="ellipse">
             <a:avLst/>
           </a:prstGeom>
           <a:solidFill>
-            <a:srgbClr val="81B2DF"/>
+            <a:srgbClr val="1FC7E9"/>
           </a:solidFill>
           <a:ln>
             <a:noFill/>
@@ -11345,9 +11348,7 @@
             <a:avLst/>
           </a:prstGeom>
           <a:solidFill>
-            <a:srgbClr val="0DC3E7">
-              <a:alpha val="74902"/>
-            </a:srgbClr>
+            <a:srgbClr val="1FC7E9"/>
           </a:solidFill>
           <a:ln w="12700" cap="flat" cmpd="sng" algn="ctr">
             <a:noFill/>
@@ -11666,7 +11667,7 @@
         </p:nvSpPr>
         <p:spPr>
           <a:xfrm>
-            <a:off x="-4427" y="709028"/>
+            <a:off x="-4427" y="726956"/>
             <a:ext cx="2314706" cy="411397"/>
           </a:xfrm>
           <a:prstGeom prst="rect">
@@ -11727,48 +11728,13 @@
       </p:sp>
       <p:cxnSp>
         <p:nvCxnSpPr>
-          <p:cNvPr id="14" name="Straight Connector 13"/>
-          <p:cNvCxnSpPr/>
-          <p:nvPr/>
-        </p:nvCxnSpPr>
-        <p:spPr>
-          <a:xfrm>
-            <a:off x="-5752" y="1570396"/>
-            <a:ext cx="3282950" cy="0"/>
-          </a:xfrm>
-          <a:prstGeom prst="line">
-            <a:avLst/>
-          </a:prstGeom>
-          <a:ln w="12700">
-            <a:solidFill>
-              <a:schemeClr val="tx1"/>
-            </a:solidFill>
-          </a:ln>
-        </p:spPr>
-        <p:style>
-          <a:lnRef idx="1">
-            <a:schemeClr val="accent1"/>
-          </a:lnRef>
-          <a:fillRef idx="0">
-            <a:schemeClr val="accent1"/>
-          </a:fillRef>
-          <a:effectRef idx="0">
-            <a:schemeClr val="accent1"/>
-          </a:effectRef>
-          <a:fontRef idx="minor">
-            <a:schemeClr val="tx1"/>
-          </a:fontRef>
-        </p:style>
-      </p:cxnSp>
-      <p:cxnSp>
-        <p:nvCxnSpPr>
           <p:cNvPr id="15" name="Straight Connector 14"/>
           <p:cNvCxnSpPr/>
           <p:nvPr/>
         </p:nvCxnSpPr>
         <p:spPr>
           <a:xfrm>
-            <a:off x="-1464" y="701569"/>
+            <a:off x="-1464" y="719497"/>
             <a:ext cx="3282950" cy="0"/>
           </a:xfrm>
           <a:prstGeom prst="line">
@@ -11805,7 +11771,7 @@
         </p:nvCxnSpPr>
         <p:spPr>
           <a:xfrm>
-            <a:off x="7500" y="1117176"/>
+            <a:off x="7500" y="1135104"/>
             <a:ext cx="3276326" cy="0"/>
           </a:xfrm>
           <a:prstGeom prst="line">
@@ -11842,7 +11808,7 @@
         </p:nvSpPr>
         <p:spPr>
           <a:xfrm>
-            <a:off x="-4427" y="1121644"/>
+            <a:off x="-4427" y="1139572"/>
             <a:ext cx="3289624" cy="448748"/>
           </a:xfrm>
           <a:prstGeom prst="rect">
@@ -11909,7 +11875,7 @@
         </p:nvSpPr>
         <p:spPr>
           <a:xfrm>
-            <a:off x="120225" y="528684"/>
+            <a:off x="120225" y="546612"/>
             <a:ext cx="232756" cy="219932"/>
           </a:xfrm>
           <a:prstGeom prst="rect">
@@ -11938,7 +11904,7 @@
         </p:nvCxnSpPr>
         <p:spPr>
           <a:xfrm>
-            <a:off x="2797052" y="741990"/>
+            <a:off x="2797052" y="759918"/>
             <a:ext cx="0" cy="785999"/>
           </a:xfrm>
           <a:prstGeom prst="line">
@@ -11975,7 +11941,7 @@
         </p:nvCxnSpPr>
         <p:spPr>
           <a:xfrm>
-            <a:off x="2302751" y="744794"/>
+            <a:off x="2302751" y="762722"/>
             <a:ext cx="0" cy="785999"/>
           </a:xfrm>
           <a:prstGeom prst="line">
@@ -12012,7 +11978,7 @@
         </p:nvCxnSpPr>
         <p:spPr>
           <a:xfrm>
-            <a:off x="1805800" y="748616"/>
+            <a:off x="1805800" y="766544"/>
             <a:ext cx="0" cy="785999"/>
           </a:xfrm>
           <a:prstGeom prst="line">
@@ -12049,7 +12015,7 @@
         </p:nvCxnSpPr>
         <p:spPr>
           <a:xfrm>
-            <a:off x="1341979" y="744794"/>
+            <a:off x="1341979" y="762722"/>
             <a:ext cx="0" cy="785999"/>
           </a:xfrm>
           <a:prstGeom prst="line">
@@ -12086,7 +12052,7 @@
         </p:nvCxnSpPr>
         <p:spPr>
           <a:xfrm>
-            <a:off x="891410" y="741994"/>
+            <a:off x="891410" y="759922"/>
             <a:ext cx="0" cy="785999"/>
           </a:xfrm>
           <a:prstGeom prst="line">
@@ -12123,7 +12089,7 @@
         </p:nvCxnSpPr>
         <p:spPr>
           <a:xfrm>
-            <a:off x="452768" y="751420"/>
+            <a:off x="452768" y="769348"/>
             <a:ext cx="0" cy="779373"/>
           </a:xfrm>
           <a:prstGeom prst="line">
@@ -12160,7 +12126,7 @@
         </p:nvSpPr>
         <p:spPr>
           <a:xfrm>
-            <a:off x="535859" y="528684"/>
+            <a:off x="535859" y="546612"/>
             <a:ext cx="276038" cy="219932"/>
           </a:xfrm>
           <a:prstGeom prst="rect">
@@ -12189,7 +12155,7 @@
         </p:nvSpPr>
         <p:spPr>
           <a:xfrm>
-            <a:off x="999318" y="529309"/>
+            <a:off x="999318" y="547237"/>
             <a:ext cx="217398" cy="219932"/>
           </a:xfrm>
           <a:prstGeom prst="rect">
@@ -12219,7 +12185,7 @@
         </p:nvSpPr>
         <p:spPr>
           <a:xfrm>
-            <a:off x="1432783" y="522062"/>
+            <a:off x="1432783" y="539990"/>
             <a:ext cx="222946" cy="219932"/>
           </a:xfrm>
           <a:prstGeom prst="rect">
@@ -12249,7 +12215,7 @@
         </p:nvSpPr>
         <p:spPr>
           <a:xfrm>
-            <a:off x="1932475" y="523206"/>
+            <a:off x="1932475" y="541134"/>
             <a:ext cx="154742" cy="219932"/>
           </a:xfrm>
           <a:prstGeom prst="rect">
@@ -12279,7 +12245,7 @@
         </p:nvSpPr>
         <p:spPr>
           <a:xfrm>
-            <a:off x="2423060" y="526012"/>
+            <a:off x="2423060" y="543940"/>
             <a:ext cx="232756" cy="219932"/>
           </a:xfrm>
           <a:prstGeom prst="rect">
@@ -12309,7 +12275,7 @@
         </p:nvSpPr>
         <p:spPr>
           <a:xfrm rot="10800000" flipH="1" flipV="1">
-            <a:off x="2906847" y="532450"/>
+            <a:off x="2906847" y="550378"/>
             <a:ext cx="288998" cy="219932"/>
           </a:xfrm>
           <a:prstGeom prst="rect">
@@ -12339,7 +12305,7 @@
         </p:nvSpPr>
         <p:spPr>
           <a:xfrm>
-            <a:off x="27215" y="765792"/>
+            <a:off x="27215" y="783720"/>
             <a:ext cx="367408" cy="307777"/>
           </a:xfrm>
           <a:prstGeom prst="rect">
@@ -12369,7 +12335,7 @@
         </p:nvSpPr>
         <p:spPr>
           <a:xfrm>
-            <a:off x="2306007" y="709028"/>
+            <a:off x="2306007" y="726956"/>
             <a:ext cx="979190" cy="414190"/>
           </a:xfrm>
           <a:prstGeom prst="rect">
@@ -12436,7 +12402,7 @@
         </p:nvSpPr>
         <p:spPr>
           <a:xfrm>
-            <a:off x="476834" y="769466"/>
+            <a:off x="476834" y="787394"/>
             <a:ext cx="367408" cy="307777"/>
           </a:xfrm>
           <a:prstGeom prst="rect">
@@ -12466,7 +12432,7 @@
         </p:nvSpPr>
         <p:spPr>
           <a:xfrm>
-            <a:off x="921896" y="741771"/>
+            <a:off x="921896" y="759699"/>
             <a:ext cx="383438" cy="430887"/>
           </a:xfrm>
           <a:prstGeom prst="rect">
@@ -12516,7 +12482,7 @@
         </p:nvSpPr>
         <p:spPr>
           <a:xfrm>
-            <a:off x="1421468" y="775663"/>
+            <a:off x="1421468" y="793591"/>
             <a:ext cx="276038" cy="307777"/>
           </a:xfrm>
           <a:prstGeom prst="rect">
@@ -12548,13 +12514,13 @@
       </p:sp>
       <p:sp>
         <p:nvSpPr>
-          <p:cNvPr id="56" name="TextBox 55"/>
+          <p:cNvPr id="57" name="TextBox 56"/>
           <p:cNvSpPr txBox="1"/>
           <p:nvPr/>
         </p:nvSpPr>
         <p:spPr>
           <a:xfrm>
-            <a:off x="1898678" y="779673"/>
+            <a:off x="2398884" y="792123"/>
             <a:ext cx="276038" cy="307777"/>
           </a:xfrm>
           <a:prstGeom prst="rect">
@@ -12574,7 +12540,7 @@
                   <a:schemeClr val="accent2"/>
                 </a:solidFill>
               </a:rPr>
-              <a:t>3</a:t>
+              <a:t>4</a:t>
             </a:r>
             <a:endParaRPr lang="en-US" dirty="0">
               <a:solidFill>
@@ -12586,13 +12552,13 @@
       </p:sp>
       <p:sp>
         <p:nvSpPr>
-          <p:cNvPr id="57" name="TextBox 56"/>
+          <p:cNvPr id="56" name="TextBox 55"/>
           <p:cNvSpPr txBox="1"/>
           <p:nvPr/>
         </p:nvSpPr>
         <p:spPr>
           <a:xfrm>
-            <a:off x="2398884" y="783685"/>
+            <a:off x="1898678" y="797601"/>
             <a:ext cx="276038" cy="307777"/>
           </a:xfrm>
           <a:prstGeom prst="rect">
@@ -12612,7 +12578,7 @@
                   <a:schemeClr val="accent2"/>
                 </a:solidFill>
               </a:rPr>
-              <a:t>4</a:t>
+              <a:t>3</a:t>
             </a:r>
             <a:endParaRPr lang="en-US" dirty="0">
               <a:solidFill>
@@ -12630,7 +12596,7 @@
         </p:nvSpPr>
         <p:spPr>
           <a:xfrm>
-            <a:off x="2874742" y="771323"/>
+            <a:off x="2874742" y="789251"/>
             <a:ext cx="276038" cy="307777"/>
           </a:xfrm>
           <a:prstGeom prst="rect">
@@ -12668,7 +12634,7 @@
         </p:nvSpPr>
         <p:spPr>
           <a:xfrm>
-            <a:off x="68963" y="1165616"/>
+            <a:off x="68963" y="1183544"/>
             <a:ext cx="276038" cy="307777"/>
           </a:xfrm>
           <a:prstGeom prst="rect">
@@ -12706,7 +12672,7 @@
         </p:nvSpPr>
         <p:spPr>
           <a:xfrm>
-            <a:off x="522519" y="1169245"/>
+            <a:off x="522519" y="1187173"/>
             <a:ext cx="276038" cy="307777"/>
           </a:xfrm>
           <a:prstGeom prst="rect">
@@ -12744,7 +12710,7 @@
         </p:nvSpPr>
         <p:spPr>
           <a:xfrm>
-            <a:off x="973623" y="1168056"/>
+            <a:off x="973623" y="1185984"/>
             <a:ext cx="276038" cy="307777"/>
           </a:xfrm>
           <a:prstGeom prst="rect">
@@ -12774,7 +12740,7 @@
         </p:nvSpPr>
         <p:spPr>
           <a:xfrm>
-            <a:off x="1422033" y="1164045"/>
+            <a:off x="1422033" y="1181973"/>
             <a:ext cx="276038" cy="307777"/>
           </a:xfrm>
           <a:prstGeom prst="rect">
@@ -12804,7 +12770,7 @@
         </p:nvSpPr>
         <p:spPr>
           <a:xfrm>
-            <a:off x="1849965" y="1169245"/>
+            <a:off x="1849965" y="1187173"/>
             <a:ext cx="367408" cy="307777"/>
           </a:xfrm>
           <a:prstGeom prst="rect">
@@ -12834,7 +12800,7 @@
         </p:nvSpPr>
         <p:spPr>
           <a:xfrm>
-            <a:off x="2366198" y="1174736"/>
+            <a:off x="2366198" y="1192664"/>
             <a:ext cx="367408" cy="307777"/>
           </a:xfrm>
           <a:prstGeom prst="rect">
@@ -12864,7 +12830,7 @@
         </p:nvSpPr>
         <p:spPr>
           <a:xfrm>
-            <a:off x="2848954" y="1179191"/>
+            <a:off x="2848954" y="1197119"/>
             <a:ext cx="367408" cy="307777"/>
           </a:xfrm>
           <a:prstGeom prst="rect">
@@ -12886,6 +12852,655 @@
           </a:p>
         </p:txBody>
       </p:sp>
+      <p:sp>
+        <p:nvSpPr>
+          <p:cNvPr id="44" name="Rectangle 43"/>
+          <p:cNvSpPr/>
+          <p:nvPr/>
+        </p:nvSpPr>
+        <p:spPr>
+          <a:xfrm>
+            <a:off x="-4676" y="2020007"/>
+            <a:ext cx="3288501" cy="1479339"/>
+          </a:xfrm>
+          <a:prstGeom prst="rect">
+            <a:avLst/>
+          </a:prstGeom>
+          <a:solidFill>
+            <a:schemeClr val="tx1">
+              <a:alpha val="4000"/>
+            </a:schemeClr>
+          </a:solidFill>
+          <a:ln w="12700" cap="flat" cmpd="sng" algn="ctr">
+            <a:noFill/>
+            <a:prstDash val="solid"/>
+          </a:ln>
+          <a:effectLst/>
+        </p:spPr>
+        <p:txBody>
+          <a:bodyPr rot="0" spcFirstLastPara="0" vertOverflow="overflow" horzOverflow="overflow" vert="horz" wrap="square" lIns="45720" tIns="45720" rIns="45720" bIns="45720" numCol="1" spcCol="0" rtlCol="0" fromWordArt="0" anchor="ctr" anchorCtr="0" forceAA="0" compatLnSpc="1">
+            <a:prstTxWarp prst="textNoShape">
+              <a:avLst/>
+            </a:prstTxWarp>
+            <a:noAutofit/>
+          </a:bodyPr>
+          <a:lstStyle/>
+          <a:p>
+            <a:pPr marL="0" marR="0" indent="0" algn="r" defTabSz="914400" eaLnBrk="1" fontAlgn="auto" latinLnBrk="0" hangingPunct="1">
+              <a:lnSpc>
+                <a:spcPct val="100000"/>
+              </a:lnSpc>
+              <a:spcBef>
+                <a:spcPts val="0"/>
+              </a:spcBef>
+              <a:spcAft>
+                <a:spcPts val="0"/>
+              </a:spcAft>
+              <a:buClrTx/>
+              <a:buSzTx/>
+              <a:buFontTx/>
+              <a:buNone/>
+              <a:tabLst/>
+            </a:pPr>
+            <a:endParaRPr kumimoji="0" lang="en-US" sz="1000" i="0" u="none" strike="noStrike" kern="0" cap="none" spc="0" normalizeH="0" baseline="0" noProof="0" dirty="0" smtClean="0">
+              <a:ln>
+                <a:noFill/>
+              </a:ln>
+              <a:solidFill>
+                <a:srgbClr val="FFFFFF"/>
+              </a:solidFill>
+              <a:effectLst/>
+              <a:uLnTx/>
+              <a:uFillTx/>
+              <a:latin typeface="Segoe UI"/>
+              <a:ea typeface="+mn-ea"/>
+              <a:cs typeface="+mn-cs"/>
+            </a:endParaRPr>
+          </a:p>
+        </p:txBody>
+      </p:sp>
+      <p:sp>
+        <p:nvSpPr>
+          <p:cNvPr id="49" name="Rectangle 48"/>
+          <p:cNvSpPr/>
+          <p:nvPr/>
+        </p:nvSpPr>
+        <p:spPr>
+          <a:xfrm>
+            <a:off x="-4427" y="1585971"/>
+            <a:ext cx="3289675" cy="198493"/>
+          </a:xfrm>
+          <a:prstGeom prst="rect">
+            <a:avLst/>
+          </a:prstGeom>
+          <a:solidFill>
+            <a:schemeClr val="tx1">
+              <a:lumMod val="85000"/>
+              <a:lumOff val="15000"/>
+              <a:alpha val="9000"/>
+            </a:schemeClr>
+          </a:solidFill>
+          <a:ln w="12700" cap="flat" cmpd="sng" algn="ctr">
+            <a:noFill/>
+            <a:prstDash val="solid"/>
+          </a:ln>
+          <a:effectLst/>
+        </p:spPr>
+        <p:txBody>
+          <a:bodyPr rot="0" spcFirstLastPara="0" vertOverflow="overflow" horzOverflow="overflow" vert="horz" wrap="square" lIns="45720" tIns="45720" rIns="45720" bIns="45720" numCol="1" spcCol="0" rtlCol="0" fromWordArt="0" anchor="ctr" anchorCtr="0" forceAA="0" compatLnSpc="1">
+            <a:prstTxWarp prst="textNoShape">
+              <a:avLst/>
+            </a:prstTxWarp>
+            <a:noAutofit/>
+          </a:bodyPr>
+          <a:lstStyle/>
+          <a:p>
+            <a:pPr defTabSz="914400"/>
+            <a:r>
+              <a:rPr lang="en-US" sz="1000" cap="all" dirty="0">
+                <a:solidFill>
+                  <a:schemeClr val="tx1">
+                    <a:lumMod val="75000"/>
+                    <a:lumOff val="25000"/>
+                  </a:schemeClr>
+                </a:solidFill>
+              </a:rPr>
+              <a:t>Today  ● </a:t>
+            </a:r>
+            <a:r>
+              <a:rPr lang="en-US" sz="1000" cap="all" dirty="0" smtClean="0">
+                <a:solidFill>
+                  <a:schemeClr val="tx1">
+                    <a:lumMod val="75000"/>
+                    <a:lumOff val="25000"/>
+                  </a:schemeClr>
+                </a:solidFill>
+              </a:rPr>
+              <a:t> Friday, October 4</a:t>
+            </a:r>
+            <a:r>
+              <a:rPr lang="en-US" sz="1000" cap="all" baseline="30000" dirty="0" smtClean="0">
+                <a:solidFill>
+                  <a:schemeClr val="tx1">
+                    <a:lumMod val="75000"/>
+                    <a:lumOff val="25000"/>
+                  </a:schemeClr>
+                </a:solidFill>
+              </a:rPr>
+              <a:t>th</a:t>
+            </a:r>
+            <a:endParaRPr kumimoji="0" lang="en-US" sz="1000" i="0" u="none" strike="noStrike" kern="0" cap="all" spc="0" normalizeH="0" baseline="0" noProof="0" dirty="0" smtClean="0">
+              <a:ln>
+                <a:noFill/>
+              </a:ln>
+              <a:solidFill>
+                <a:schemeClr val="tx1">
+                  <a:lumMod val="75000"/>
+                  <a:lumOff val="25000"/>
+                </a:schemeClr>
+              </a:solidFill>
+              <a:effectLst/>
+              <a:uLnTx/>
+              <a:uFillTx/>
+              <a:latin typeface="Segoe UI"/>
+            </a:endParaRPr>
+          </a:p>
+        </p:txBody>
+      </p:sp>
+      <p:cxnSp>
+        <p:nvCxnSpPr>
+          <p:cNvPr id="11" name="Straight Connector 10"/>
+          <p:cNvCxnSpPr/>
+          <p:nvPr/>
+        </p:nvCxnSpPr>
+        <p:spPr>
+          <a:xfrm>
+            <a:off x="-4427" y="1779531"/>
+            <a:ext cx="3285913" cy="0"/>
+          </a:xfrm>
+          <a:prstGeom prst="line">
+            <a:avLst/>
+          </a:prstGeom>
+          <a:ln>
+            <a:solidFill>
+              <a:schemeClr val="bg1">
+                <a:lumMod val="75000"/>
+              </a:schemeClr>
+            </a:solidFill>
+          </a:ln>
+        </p:spPr>
+        <p:style>
+          <a:lnRef idx="1">
+            <a:schemeClr val="accent1"/>
+          </a:lnRef>
+          <a:fillRef idx="0">
+            <a:schemeClr val="accent1"/>
+          </a:fillRef>
+          <a:effectRef idx="0">
+            <a:schemeClr val="accent1"/>
+          </a:effectRef>
+          <a:fontRef idx="minor">
+            <a:schemeClr val="tx1"/>
+          </a:fontRef>
+        </p:style>
+      </p:cxnSp>
+      <p:sp>
+        <p:nvSpPr>
+          <p:cNvPr id="67" name="Rectangle 66"/>
+          <p:cNvSpPr/>
+          <p:nvPr/>
+        </p:nvSpPr>
+        <p:spPr>
+          <a:xfrm>
+            <a:off x="-865" y="1779530"/>
+            <a:ext cx="3283815" cy="240477"/>
+          </a:xfrm>
+          <a:prstGeom prst="rect">
+            <a:avLst/>
+          </a:prstGeom>
+          <a:solidFill>
+            <a:srgbClr val="F5F5F5"/>
+          </a:solidFill>
+          <a:ln w="12700" cap="flat" cmpd="sng" algn="ctr">
+            <a:noFill/>
+            <a:prstDash val="solid"/>
+          </a:ln>
+          <a:effectLst/>
+        </p:spPr>
+        <p:txBody>
+          <a:bodyPr rot="0" spcFirstLastPara="0" vertOverflow="overflow" horzOverflow="overflow" vert="horz" wrap="square" lIns="45720" tIns="45720" rIns="45720" bIns="45720" numCol="1" spcCol="0" rtlCol="0" fromWordArt="0" anchor="ctr" anchorCtr="0" forceAA="0" compatLnSpc="1">
+            <a:prstTxWarp prst="textNoShape">
+              <a:avLst/>
+            </a:prstTxWarp>
+            <a:noAutofit/>
+          </a:bodyPr>
+          <a:lstStyle/>
+          <a:p>
+            <a:pPr defTabSz="914400"/>
+            <a:r>
+              <a:rPr lang="en-US" sz="1000" dirty="0" smtClean="0">
+                <a:solidFill>
+                  <a:srgbClr val="1FC7E9"/>
+                </a:solidFill>
+              </a:rPr>
+              <a:t>Morning</a:t>
+            </a:r>
+            <a:endParaRPr kumimoji="0" lang="en-US" sz="1000" i="0" u="none" strike="noStrike" kern="0" cap="none" spc="0" normalizeH="0" baseline="0" noProof="0" dirty="0" smtClean="0">
+              <a:ln>
+                <a:noFill/>
+              </a:ln>
+              <a:solidFill>
+                <a:srgbClr val="1FC7E9"/>
+              </a:solidFill>
+              <a:effectLst/>
+              <a:uLnTx/>
+              <a:uFillTx/>
+              <a:latin typeface="Segoe UI"/>
+            </a:endParaRPr>
+          </a:p>
+        </p:txBody>
+      </p:sp>
+      <p:cxnSp>
+        <p:nvCxnSpPr>
+          <p:cNvPr id="68" name="Straight Connector 67"/>
+          <p:cNvCxnSpPr/>
+          <p:nvPr/>
+        </p:nvCxnSpPr>
+        <p:spPr>
+          <a:xfrm>
+            <a:off x="-2087" y="2024940"/>
+            <a:ext cx="3285913" cy="0"/>
+          </a:xfrm>
+          <a:prstGeom prst="line">
+            <a:avLst/>
+          </a:prstGeom>
+          <a:ln>
+            <a:solidFill>
+              <a:schemeClr val="bg1">
+                <a:lumMod val="75000"/>
+              </a:schemeClr>
+            </a:solidFill>
+          </a:ln>
+        </p:spPr>
+        <p:style>
+          <a:lnRef idx="1">
+            <a:schemeClr val="accent1"/>
+          </a:lnRef>
+          <a:fillRef idx="0">
+            <a:schemeClr val="accent1"/>
+          </a:fillRef>
+          <a:effectRef idx="0">
+            <a:schemeClr val="accent1"/>
+          </a:effectRef>
+          <a:fontRef idx="minor">
+            <a:schemeClr val="tx1"/>
+          </a:fontRef>
+        </p:style>
+      </p:cxnSp>
+      <p:sp>
+        <p:nvSpPr>
+          <p:cNvPr id="69" name="Rectangle 68"/>
+          <p:cNvSpPr/>
+          <p:nvPr/>
+        </p:nvSpPr>
+        <p:spPr>
+          <a:xfrm>
+            <a:off x="-865" y="3502583"/>
+            <a:ext cx="3283815" cy="240477"/>
+          </a:xfrm>
+          <a:prstGeom prst="rect">
+            <a:avLst/>
+          </a:prstGeom>
+          <a:solidFill>
+            <a:srgbClr val="F5F5F5"/>
+          </a:solidFill>
+          <a:ln w="12700" cap="flat" cmpd="sng" algn="ctr">
+            <a:noFill/>
+            <a:prstDash val="solid"/>
+          </a:ln>
+          <a:effectLst/>
+        </p:spPr>
+        <p:txBody>
+          <a:bodyPr rot="0" spcFirstLastPara="0" vertOverflow="overflow" horzOverflow="overflow" vert="horz" wrap="square" lIns="45720" tIns="45720" rIns="45720" bIns="45720" numCol="1" spcCol="0" rtlCol="0" fromWordArt="0" anchor="ctr" anchorCtr="0" forceAA="0" compatLnSpc="1">
+            <a:prstTxWarp prst="textNoShape">
+              <a:avLst/>
+            </a:prstTxWarp>
+            <a:noAutofit/>
+          </a:bodyPr>
+          <a:lstStyle/>
+          <a:p>
+            <a:pPr defTabSz="914400"/>
+            <a:r>
+              <a:rPr lang="en-US" sz="1000" dirty="0" smtClean="0">
+                <a:solidFill>
+                  <a:srgbClr val="1FC7E9"/>
+                </a:solidFill>
+              </a:rPr>
+              <a:t>Afternoon</a:t>
+            </a:r>
+            <a:endParaRPr kumimoji="0" lang="en-US" sz="1000" i="0" u="none" strike="noStrike" kern="0" cap="none" spc="0" normalizeH="0" baseline="0" noProof="0" dirty="0" smtClean="0">
+              <a:ln>
+                <a:noFill/>
+              </a:ln>
+              <a:solidFill>
+                <a:srgbClr val="1FC7E9"/>
+              </a:solidFill>
+              <a:effectLst/>
+              <a:uLnTx/>
+              <a:uFillTx/>
+              <a:latin typeface="Segoe UI"/>
+            </a:endParaRPr>
+          </a:p>
+        </p:txBody>
+      </p:sp>
+      <p:cxnSp>
+        <p:nvCxnSpPr>
+          <p:cNvPr id="70" name="Straight Connector 69"/>
+          <p:cNvCxnSpPr/>
+          <p:nvPr/>
+        </p:nvCxnSpPr>
+        <p:spPr>
+          <a:xfrm>
+            <a:off x="-2087" y="3743060"/>
+            <a:ext cx="3285913" cy="0"/>
+          </a:xfrm>
+          <a:prstGeom prst="line">
+            <a:avLst/>
+          </a:prstGeom>
+          <a:ln>
+            <a:solidFill>
+              <a:schemeClr val="bg1">
+                <a:lumMod val="75000"/>
+              </a:schemeClr>
+            </a:solidFill>
+          </a:ln>
+        </p:spPr>
+        <p:style>
+          <a:lnRef idx="1">
+            <a:schemeClr val="accent1"/>
+          </a:lnRef>
+          <a:fillRef idx="0">
+            <a:schemeClr val="accent1"/>
+          </a:fillRef>
+          <a:effectRef idx="0">
+            <a:schemeClr val="accent1"/>
+          </a:effectRef>
+          <a:fontRef idx="minor">
+            <a:schemeClr val="tx1"/>
+          </a:fontRef>
+        </p:style>
+      </p:cxnSp>
+      <p:cxnSp>
+        <p:nvCxnSpPr>
+          <p:cNvPr id="71" name="Straight Connector 70"/>
+          <p:cNvCxnSpPr/>
+          <p:nvPr/>
+        </p:nvCxnSpPr>
+        <p:spPr>
+          <a:xfrm>
+            <a:off x="-2087" y="3498667"/>
+            <a:ext cx="3285913" cy="0"/>
+          </a:xfrm>
+          <a:prstGeom prst="line">
+            <a:avLst/>
+          </a:prstGeom>
+          <a:ln>
+            <a:solidFill>
+              <a:schemeClr val="bg1">
+                <a:lumMod val="75000"/>
+              </a:schemeClr>
+            </a:solidFill>
+          </a:ln>
+        </p:spPr>
+        <p:style>
+          <a:lnRef idx="1">
+            <a:schemeClr val="accent1"/>
+          </a:lnRef>
+          <a:fillRef idx="0">
+            <a:schemeClr val="accent1"/>
+          </a:fillRef>
+          <a:effectRef idx="0">
+            <a:schemeClr val="accent1"/>
+          </a:effectRef>
+          <a:fontRef idx="minor">
+            <a:schemeClr val="tx1"/>
+          </a:fontRef>
+        </p:style>
+      </p:cxnSp>
+      <p:cxnSp>
+        <p:nvCxnSpPr>
+          <p:cNvPr id="72" name="Straight Connector 71"/>
+          <p:cNvCxnSpPr/>
+          <p:nvPr/>
+        </p:nvCxnSpPr>
+        <p:spPr>
+          <a:xfrm>
+            <a:off x="1464" y="1588320"/>
+            <a:ext cx="3285913" cy="0"/>
+          </a:xfrm>
+          <a:prstGeom prst="line">
+            <a:avLst/>
+          </a:prstGeom>
+          <a:ln>
+            <a:solidFill>
+              <a:schemeClr val="bg1">
+                <a:lumMod val="75000"/>
+              </a:schemeClr>
+            </a:solidFill>
+          </a:ln>
+        </p:spPr>
+        <p:style>
+          <a:lnRef idx="1">
+            <a:schemeClr val="accent1"/>
+          </a:lnRef>
+          <a:fillRef idx="0">
+            <a:schemeClr val="accent1"/>
+          </a:fillRef>
+          <a:effectRef idx="0">
+            <a:schemeClr val="accent1"/>
+          </a:effectRef>
+          <a:fontRef idx="minor">
+            <a:schemeClr val="tx1"/>
+          </a:fontRef>
+        </p:style>
+      </p:cxnSp>
+      <p:sp>
+        <p:nvSpPr>
+          <p:cNvPr id="73" name="Rectangle 72"/>
+          <p:cNvSpPr/>
+          <p:nvPr/>
+        </p:nvSpPr>
+        <p:spPr>
+          <a:xfrm>
+            <a:off x="-1464" y="3747719"/>
+            <a:ext cx="3288501" cy="1479339"/>
+          </a:xfrm>
+          <a:prstGeom prst="rect">
+            <a:avLst/>
+          </a:prstGeom>
+          <a:solidFill>
+            <a:schemeClr val="tx1">
+              <a:alpha val="4000"/>
+            </a:schemeClr>
+          </a:solidFill>
+          <a:ln w="12700" cap="flat" cmpd="sng" algn="ctr">
+            <a:noFill/>
+            <a:prstDash val="solid"/>
+          </a:ln>
+          <a:effectLst/>
+        </p:spPr>
+        <p:txBody>
+          <a:bodyPr rot="0" spcFirstLastPara="0" vertOverflow="overflow" horzOverflow="overflow" vert="horz" wrap="square" lIns="45720" tIns="45720" rIns="45720" bIns="45720" numCol="1" spcCol="0" rtlCol="0" fromWordArt="0" anchor="ctr" anchorCtr="0" forceAA="0" compatLnSpc="1">
+            <a:prstTxWarp prst="textNoShape">
+              <a:avLst/>
+            </a:prstTxWarp>
+            <a:noAutofit/>
+          </a:bodyPr>
+          <a:lstStyle/>
+          <a:p>
+            <a:pPr marL="0" marR="0" indent="0" algn="r" defTabSz="914400" eaLnBrk="1" fontAlgn="auto" latinLnBrk="0" hangingPunct="1">
+              <a:lnSpc>
+                <a:spcPct val="100000"/>
+              </a:lnSpc>
+              <a:spcBef>
+                <a:spcPts val="0"/>
+              </a:spcBef>
+              <a:spcAft>
+                <a:spcPts val="0"/>
+              </a:spcAft>
+              <a:buClrTx/>
+              <a:buSzTx/>
+              <a:buFontTx/>
+              <a:buNone/>
+              <a:tabLst/>
+            </a:pPr>
+            <a:endParaRPr kumimoji="0" lang="en-US" sz="1000" i="0" u="none" strike="noStrike" kern="0" cap="none" spc="0" normalizeH="0" baseline="0" noProof="0" dirty="0" smtClean="0">
+              <a:ln>
+                <a:noFill/>
+              </a:ln>
+              <a:solidFill>
+                <a:srgbClr val="FFFFFF"/>
+              </a:solidFill>
+              <a:effectLst/>
+              <a:uLnTx/>
+              <a:uFillTx/>
+              <a:latin typeface="Segoe UI"/>
+              <a:ea typeface="+mn-ea"/>
+              <a:cs typeface="+mn-cs"/>
+            </a:endParaRPr>
+          </a:p>
+        </p:txBody>
+      </p:sp>
+      <p:sp>
+        <p:nvSpPr>
+          <p:cNvPr id="74" name="Rectangle 73"/>
+          <p:cNvSpPr/>
+          <p:nvPr/>
+        </p:nvSpPr>
+        <p:spPr>
+          <a:xfrm>
+            <a:off x="-865" y="5231716"/>
+            <a:ext cx="3283815" cy="240477"/>
+          </a:xfrm>
+          <a:prstGeom prst="rect">
+            <a:avLst/>
+          </a:prstGeom>
+          <a:solidFill>
+            <a:srgbClr val="F5F5F5"/>
+          </a:solidFill>
+          <a:ln w="12700" cap="flat" cmpd="sng" algn="ctr">
+            <a:noFill/>
+            <a:prstDash val="solid"/>
+          </a:ln>
+          <a:effectLst/>
+        </p:spPr>
+        <p:txBody>
+          <a:bodyPr rot="0" spcFirstLastPara="0" vertOverflow="overflow" horzOverflow="overflow" vert="horz" wrap="square" lIns="45720" tIns="45720" rIns="45720" bIns="45720" numCol="1" spcCol="0" rtlCol="0" fromWordArt="0" anchor="ctr" anchorCtr="0" forceAA="0" compatLnSpc="1">
+            <a:prstTxWarp prst="textNoShape">
+              <a:avLst/>
+            </a:prstTxWarp>
+            <a:noAutofit/>
+          </a:bodyPr>
+          <a:lstStyle/>
+          <a:p>
+            <a:pPr defTabSz="914400"/>
+            <a:r>
+              <a:rPr lang="en-US" sz="1000" dirty="0" smtClean="0">
+                <a:solidFill>
+                  <a:srgbClr val="1FC7E9"/>
+                </a:solidFill>
+              </a:rPr>
+              <a:t>Evening</a:t>
+            </a:r>
+            <a:endParaRPr kumimoji="0" lang="en-US" sz="1000" i="0" u="none" strike="noStrike" kern="0" cap="none" spc="0" normalizeH="0" baseline="0" noProof="0" dirty="0" smtClean="0">
+              <a:ln>
+                <a:noFill/>
+              </a:ln>
+              <a:solidFill>
+                <a:srgbClr val="1FC7E9"/>
+              </a:solidFill>
+              <a:effectLst/>
+              <a:uLnTx/>
+              <a:uFillTx/>
+              <a:latin typeface="Segoe UI"/>
+            </a:endParaRPr>
+          </a:p>
+        </p:txBody>
+      </p:sp>
+      <p:cxnSp>
+        <p:nvCxnSpPr>
+          <p:cNvPr id="75" name="Straight Connector 74"/>
+          <p:cNvCxnSpPr/>
+          <p:nvPr/>
+        </p:nvCxnSpPr>
+        <p:spPr>
+          <a:xfrm>
+            <a:off x="1464" y="5231716"/>
+            <a:ext cx="3285913" cy="0"/>
+          </a:xfrm>
+          <a:prstGeom prst="line">
+            <a:avLst/>
+          </a:prstGeom>
+          <a:ln>
+            <a:solidFill>
+              <a:schemeClr val="bg1">
+                <a:lumMod val="75000"/>
+              </a:schemeClr>
+            </a:solidFill>
+          </a:ln>
+        </p:spPr>
+        <p:style>
+          <a:lnRef idx="1">
+            <a:schemeClr val="accent1"/>
+          </a:lnRef>
+          <a:fillRef idx="0">
+            <a:schemeClr val="accent1"/>
+          </a:fillRef>
+          <a:effectRef idx="0">
+            <a:schemeClr val="accent1"/>
+          </a:effectRef>
+          <a:fontRef idx="minor">
+            <a:schemeClr val="tx1"/>
+          </a:fontRef>
+        </p:style>
+      </p:cxnSp>
+      <p:cxnSp>
+        <p:nvCxnSpPr>
+          <p:cNvPr id="76" name="Straight Connector 75"/>
+          <p:cNvCxnSpPr/>
+          <p:nvPr/>
+        </p:nvCxnSpPr>
+        <p:spPr>
+          <a:xfrm>
+            <a:off x="-2087" y="5472193"/>
+            <a:ext cx="3285913" cy="0"/>
+          </a:xfrm>
+          <a:prstGeom prst="line">
+            <a:avLst/>
+          </a:prstGeom>
+          <a:ln>
+            <a:solidFill>
+              <a:schemeClr val="bg1">
+                <a:lumMod val="75000"/>
+              </a:schemeClr>
+            </a:solidFill>
+          </a:ln>
+        </p:spPr>
+        <p:style>
+          <a:lnRef idx="1">
+            <a:schemeClr val="accent1"/>
+          </a:lnRef>
+          <a:fillRef idx="0">
+            <a:schemeClr val="accent1"/>
+          </a:fillRef>
+          <a:effectRef idx="0">
+            <a:schemeClr val="accent1"/>
+          </a:effectRef>
+          <a:fontRef idx="minor">
+            <a:schemeClr val="tx1"/>
+          </a:fontRef>
+        </p:style>
+      </p:cxnSp>
     </p:spTree>
     <p:extLst>
       <p:ext uri="{BB962C8B-B14F-4D97-AF65-F5344CB8AC3E}">
@@ -13691,13 +14306,13 @@
 
 <file path=customXml/item1.xml><?xml version="1.0" encoding="utf-8"?>
 <Control xmlns="http://schemas.microsoft.com/VisualStudio/2011/storyboarding/control">
-  <Id Name="System.Storyboarding.WindowsPhone.ApplicationBar" Revision="1" Stencil="System.Storyboarding.WindowsPhone" StencilVersion="0.1"/>
+  <Id Name="System.Storyboarding.Common.TextArea" Revision="1" Stencil="System.Storyboarding.Common" StencilVersion="0.1"/>
 </Control>
 </file>
 
 <file path=customXml/item10.xml><?xml version="1.0" encoding="utf-8"?>
 <Control xmlns="http://schemas.microsoft.com/VisualStudio/2011/storyboarding/control">
-  <Id Name="System.Storyboarding.Common.Text" Revision="1" Stencil="System.Storyboarding.Common" StencilVersion="0.1"/>
+  <Id Name="System.Storyboarding.WindowsPhoneIcons.Minus" Revision="1" Stencil="System.Storyboarding.WindowsPhoneIcons" StencilVersion="0.1"/>
 </Control>
 </file>
 
@@ -13709,13 +14324,13 @@
 
 <file path=customXml/item12.xml><?xml version="1.0" encoding="utf-8"?>
 <Control xmlns="http://schemas.microsoft.com/VisualStudio/2011/storyboarding/control">
-  <Id Name="System.Storyboarding.WindowsPhoneIcons.BaseCircle" Revision="1" Stencil="System.Storyboarding.WindowsPhoneIcons" StencilVersion="0.1"/>
+  <Id Name="System.Storyboarding.Common.TextArea" Revision="1" Stencil="System.Storyboarding.Common" StencilVersion="0.1"/>
 </Control>
 </file>
 
 <file path=customXml/item13.xml><?xml version="1.0" encoding="utf-8"?>
 <Control xmlns="http://schemas.microsoft.com/VisualStudio/2011/storyboarding/control">
-  <Id Name="System.Storyboarding.Common.Breadcrumb" Revision="1" Stencil="System.Storyboarding.Common" StencilVersion="0.1"/>
+  <Id Name="System.Storyboarding.Media.PieChart" Revision="1" Stencil="System.Storyboarding.Media" StencilVersion="0.1"/>
 </Control>
 </file>
 
@@ -13727,7 +14342,7 @@
 
 <file path=customXml/item15.xml><?xml version="1.0" encoding="utf-8"?>
 <Control xmlns="http://schemas.microsoft.com/VisualStudio/2011/storyboarding/control">
-  <Id Name="System.Storyboarding.Media.Image" Revision="1" Stencil="System.Storyboarding.Media" StencilVersion="0.1"/>
+  <Id Name="System.Storyboarding.WindowsPhoneIcons.OverflowDots" Revision="1" Stencil="System.Storyboarding.WindowsPhoneIcons" StencilVersion="0.1"/>
 </Control>
 </file>
 
@@ -13739,13 +14354,13 @@
 
 <file path=customXml/item17.xml><?xml version="1.0" encoding="utf-8"?>
 <Control xmlns="http://schemas.microsoft.com/VisualStudio/2011/storyboarding/control">
-  <Id Name="System.Storyboarding.WindowsPhoneIcons.Minus" Revision="1" Stencil="System.Storyboarding.WindowsPhoneIcons" StencilVersion="0.1"/>
+  <Id Name="System.Storyboarding.WindowsPhoneIcons.BaseCircle" Revision="1" Stencil="System.Storyboarding.WindowsPhoneIcons" StencilVersion="0.1"/>
 </Control>
 </file>
 
 <file path=customXml/item18.xml><?xml version="1.0" encoding="utf-8"?>
 <Control xmlns="http://schemas.microsoft.com/VisualStudio/2011/storyboarding/control">
-  <Id Name="System.Storyboarding.Common.TextArea" Revision="1" Stencil="System.Storyboarding.Common" StencilVersion="0.1"/>
+  <Id Name="System.Storyboarding.WindowsPhoneIcons.Minus" Revision="1" Stencil="System.Storyboarding.WindowsPhoneIcons" StencilVersion="0.1"/>
 </Control>
 </file>
 
@@ -13757,19 +14372,19 @@
 
 <file path=customXml/item2.xml><?xml version="1.0" encoding="utf-8"?>
 <Control xmlns="http://schemas.microsoft.com/VisualStudio/2011/storyboarding/control">
-  <Id Name="System.Storyboarding.WindowsPhoneIcons.OverflowDots" Revision="1" Stencil="System.Storyboarding.WindowsPhoneIcons" StencilVersion="0.1"/>
+  <Id Name="System.Storyboarding.WindowsPhoneIcons.Minus" Revision="1" Stencil="System.Storyboarding.WindowsPhoneIcons" StencilVersion="0.1"/>
 </Control>
 </file>
 
 <file path=customXml/item20.xml><?xml version="1.0" encoding="utf-8"?>
 <Control xmlns="http://schemas.microsoft.com/VisualStudio/2011/storyboarding/control">
-  <Id Name="System.Storyboarding.WindowsPhoneIcons.BaseCircle" Revision="1" Stencil="System.Storyboarding.WindowsPhoneIcons" StencilVersion="0.1"/>
+  <Id Name="System.Storyboarding.WindowsPhone.ApplicationBar" Revision="1" Stencil="System.Storyboarding.WindowsPhone" StencilVersion="0.1"/>
 </Control>
 </file>
 
 <file path=customXml/item21.xml><?xml version="1.0" encoding="utf-8"?>
 <Control xmlns="http://schemas.microsoft.com/VisualStudio/2011/storyboarding/control">
-  <Id Name="System.Storyboarding.Common.Text" Revision="1" Stencil="System.Storyboarding.Common" StencilVersion="0.1"/>
+  <Id Name="System.Storyboarding.Common.Breadcrumb" Revision="1" Stencil="System.Storyboarding.Common" StencilVersion="0.1"/>
 </Control>
 </file>
 
@@ -13781,31 +14396,31 @@
 
 <file path=customXml/item23.xml><?xml version="1.0" encoding="utf-8"?>
 <Control xmlns="http://schemas.microsoft.com/VisualStudio/2011/storyboarding/control">
-  <Id Name="System.Storyboarding.WindowsPhoneIcons.Minus" Revision="1" Stencil="System.Storyboarding.WindowsPhoneIcons" StencilVersion="0.1"/>
+  <Id Name="System.Storyboarding.WindowsPhoneIcons.BaseCircle" Revision="1" Stencil="System.Storyboarding.WindowsPhoneIcons" StencilVersion="0.1"/>
 </Control>
 </file>
 
 <file path=customXml/item24.xml><?xml version="1.0" encoding="utf-8"?>
 <Control xmlns="http://schemas.microsoft.com/VisualStudio/2011/storyboarding/control">
-  <Id Name="System.Storyboarding.WindowsPhoneIcons.BaseCircle" Revision="1" Stencil="System.Storyboarding.WindowsPhoneIcons" StencilVersion="0.1"/>
+  <Id Name="System.Storyboarding.WindowsPhoneIcons.OverflowDots" Revision="1" Stencil="System.Storyboarding.WindowsPhoneIcons" StencilVersion="0.1"/>
 </Control>
 </file>
 
 <file path=customXml/item25.xml><?xml version="1.0" encoding="utf-8"?>
 <Control xmlns="http://schemas.microsoft.com/VisualStudio/2011/storyboarding/control">
-  <Id Name="System.Storyboarding.Common.Text" Revision="1" Stencil="System.Storyboarding.Common" StencilVersion="0.1"/>
+  <Id Name="System.Storyboarding.WindowsPhoneIcons.AddToFavorites" Revision="1" Stencil="System.Storyboarding.WindowsPhoneIcons" StencilVersion="0.1"/>
 </Control>
 </file>
 
 <file path=customXml/item26.xml><?xml version="1.0" encoding="utf-8"?>
 <Control xmlns="http://schemas.microsoft.com/VisualStudio/2011/storyboarding/control">
-  <Id Name="System.Storyboarding.WindowsPhoneIcons.Minus" Revision="1" Stencil="System.Storyboarding.WindowsPhoneIcons" StencilVersion="0.1"/>
+  <Id Name="System.Storyboarding.Common.Text" Revision="1" Stencil="System.Storyboarding.Common" StencilVersion="0.1"/>
 </Control>
 </file>
 
 <file path=customXml/item27.xml><?xml version="1.0" encoding="utf-8"?>
 <Control xmlns="http://schemas.microsoft.com/VisualStudio/2011/storyboarding/control">
-  <Id Name="System.Storyboarding.Media.PieChart" Revision="1" Stencil="System.Storyboarding.Media" StencilVersion="0.1"/>
+  <Id Name="System.Storyboarding.Media.Image" Revision="1" Stencil="System.Storyboarding.Media" StencilVersion="0.1"/>
 </Control>
 </file>
 
@@ -13817,37 +14432,37 @@
 
 <file path=customXml/item29.xml><?xml version="1.0" encoding="utf-8"?>
 <Control xmlns="http://schemas.microsoft.com/VisualStudio/2011/storyboarding/control">
-  <Id Name="System.Storyboarding.WindowsPhoneIcons.Minus" Revision="1" Stencil="System.Storyboarding.WindowsPhoneIcons" StencilVersion="0.1"/>
+  <Id Name="System.Storyboarding.Media.Image" Revision="1" Stencil="System.Storyboarding.Media" StencilVersion="0.1"/>
 </Control>
 </file>
 
 <file path=customXml/item3.xml><?xml version="1.0" encoding="utf-8"?>
 <Control xmlns="http://schemas.microsoft.com/VisualStudio/2011/storyboarding/control">
-  <Id Name="System.Storyboarding.Common.TextArea" Revision="1" Stencil="System.Storyboarding.Common" StencilVersion="0.1"/>
+  <Id Name="System.Storyboarding.Common.Text" Revision="1" Stencil="System.Storyboarding.Common" StencilVersion="0.1"/>
 </Control>
 </file>
 
 <file path=customXml/item30.xml><?xml version="1.0" encoding="utf-8"?>
 <Control xmlns="http://schemas.microsoft.com/VisualStudio/2011/storyboarding/control">
-  <Id Name="System.Storyboarding.WindowsPhoneIcons.AddToFavorites" Revision="1" Stencil="System.Storyboarding.WindowsPhoneIcons" StencilVersion="0.1"/>
+  <Id Name="System.Storyboarding.WindowsPhoneIcons.Minus" Revision="1" Stencil="System.Storyboarding.WindowsPhoneIcons" StencilVersion="0.1"/>
 </Control>
 </file>
 
 <file path=customXml/item31.xml><?xml version="1.0" encoding="utf-8"?>
 <Control xmlns="http://schemas.microsoft.com/VisualStudio/2011/storyboarding/control">
-  <Id Name="System.Storyboarding.Common.Text" Revision="1" Stencil="System.Storyboarding.Common" StencilVersion="0.1"/>
+  <Id Name="System.Storyboarding.WindowsPhoneIcons.BaseCircle" Revision="1" Stencil="System.Storyboarding.WindowsPhoneIcons" StencilVersion="0.1"/>
 </Control>
 </file>
 
 <file path=customXml/item32.xml><?xml version="1.0" encoding="utf-8"?>
 <Control xmlns="http://schemas.microsoft.com/VisualStudio/2011/storyboarding/control">
-  <Id Name="System.Storyboarding.WindowsPhoneIcons.OverflowDots" Revision="1" Stencil="System.Storyboarding.WindowsPhoneIcons" StencilVersion="0.1"/>
+  <Id Name="System.Storyboarding.WindowsPhoneIcons.Minus" Revision="1" Stencil="System.Storyboarding.WindowsPhoneIcons" StencilVersion="0.1"/>
 </Control>
 </file>
 
 <file path=customXml/item33.xml><?xml version="1.0" encoding="utf-8"?>
 <Control xmlns="http://schemas.microsoft.com/VisualStudio/2011/storyboarding/control">
-  <Id Name="System.Storyboarding.Common.TextArea" Revision="1" Stencil="System.Storyboarding.Common" StencilVersion="0.1"/>
+  <Id Name="System.Storyboarding.Common.Text" Revision="1" Stencil="System.Storyboarding.Common" StencilVersion="0.1"/>
 </Control>
 </file>
 
@@ -13859,37 +14474,37 @@
 
 <file path=customXml/item35.xml><?xml version="1.0" encoding="utf-8"?>
 <Control xmlns="http://schemas.microsoft.com/VisualStudio/2011/storyboarding/control">
-  <Id Name="System.Storyboarding.WindowsPhoneIcons.BaseCircle" Revision="1" Stencil="System.Storyboarding.WindowsPhoneIcons" StencilVersion="0.1"/>
+  <Id Name="System.Storyboarding.Common.Text" Revision="1" Stencil="System.Storyboarding.Common" StencilVersion="0.1"/>
 </Control>
 </file>
 
 <file path=customXml/item36.xml><?xml version="1.0" encoding="utf-8"?>
 <Control xmlns="http://schemas.microsoft.com/VisualStudio/2011/storyboarding/control">
-  <Id Name="System.Storyboarding.WindowsPhoneIcons.Minus" Revision="1" Stencil="System.Storyboarding.WindowsPhoneIcons" StencilVersion="0.1"/>
+  <Id Name="System.Storyboarding.Common.Breadcrumb" Revision="1" Stencil="System.Storyboarding.Common" StencilVersion="0.1"/>
 </Control>
 </file>
 
 <file path=customXml/item37.xml><?xml version="1.0" encoding="utf-8"?>
 <Control xmlns="http://schemas.microsoft.com/VisualStudio/2011/storyboarding/control">
-  <Id Name="System.Storyboarding.WindowsPhoneIcons.AddToFavorites" Revision="1" Stencil="System.Storyboarding.WindowsPhoneIcons" StencilVersion="0.1"/>
+  <Id Name="System.Storyboarding.WindowsPhoneIcons.OverflowDots" Revision="1" Stencil="System.Storyboarding.WindowsPhoneIcons" StencilVersion="0.1"/>
 </Control>
 </file>
 
 <file path=customXml/item38.xml><?xml version="1.0" encoding="utf-8"?>
 <Control xmlns="http://schemas.microsoft.com/VisualStudio/2011/storyboarding/control">
-  <Id Name="System.Storyboarding.Media.PieChart" Revision="1" Stencil="System.Storyboarding.Media" StencilVersion="0.1"/>
+  <Id Name="System.Storyboarding.Common.Text" Revision="1" Stencil="System.Storyboarding.Common" StencilVersion="0.1"/>
 </Control>
 </file>
 
 <file path=customXml/item39.xml><?xml version="1.0" encoding="utf-8"?>
 <Control xmlns="http://schemas.microsoft.com/VisualStudio/2011/storyboarding/control">
-  <Id Name="System.Storyboarding.Common.Text" Revision="1" Stencil="System.Storyboarding.Common" StencilVersion="0.1"/>
+  <Id Name="System.Storyboarding.WindowsPhoneIcons.BaseCircle" Revision="1" Stencil="System.Storyboarding.WindowsPhoneIcons" StencilVersion="0.1"/>
 </Control>
 </file>
 
 <file path=customXml/item4.xml><?xml version="1.0" encoding="utf-8"?>
 <Control xmlns="http://schemas.microsoft.com/VisualStudio/2011/storyboarding/control">
-  <Id Name="System.Storyboarding.WindowsPhoneIcons.OverflowDots" Revision="1" Stencil="System.Storyboarding.WindowsPhoneIcons" StencilVersion="0.1"/>
+  <Id Name="System.Storyboarding.Common.Text" Revision="1" Stencil="System.Storyboarding.Common" StencilVersion="0.1"/>
 </Control>
 </file>
 
@@ -13901,78 +14516,78 @@
 
 <file path=customXml/item41.xml><?xml version="1.0" encoding="utf-8"?>
 <Control xmlns="http://schemas.microsoft.com/VisualStudio/2011/storyboarding/control">
-  <Id Name="System.Storyboarding.WindowsPhoneIcons.Minus" Revision="1" Stencil="System.Storyboarding.WindowsPhoneIcons" StencilVersion="0.1"/>
+  <Id Name="System.Storyboarding.Media.PieChart" Revision="1" Stencil="System.Storyboarding.Media" StencilVersion="0.1"/>
 </Control>
 </file>
 
 <file path=customXml/item42.xml><?xml version="1.0" encoding="utf-8"?>
 <Control xmlns="http://schemas.microsoft.com/VisualStudio/2011/storyboarding/control">
-  <Id Name="System.Storyboarding.Common.Text" Revision="1" Stencil="System.Storyboarding.Common" StencilVersion="0.1"/>
+  <Id Name="System.Storyboarding.WindowsPhoneIcons.AddToFavorites" Revision="1" Stencil="System.Storyboarding.WindowsPhoneIcons" StencilVersion="0.1"/>
 </Control>
 </file>
 
 <file path=customXml/item43.xml><?xml version="1.0" encoding="utf-8"?>
 <Control xmlns="http://schemas.microsoft.com/VisualStudio/2011/storyboarding/control">
-  <Id Name="System.Storyboarding.WindowsPhoneIcons.Minus" Revision="1" Stencil="System.Storyboarding.WindowsPhoneIcons" StencilVersion="0.1"/>
+  <Id Name="System.Storyboarding.WindowsPhoneIcons.BaseCircle" Revision="1" Stencil="System.Storyboarding.WindowsPhoneIcons" StencilVersion="0.1"/>
 </Control>
 </file>
 
 <file path=customXml/item44.xml><?xml version="1.0" encoding="utf-8"?>
 <Control xmlns="http://schemas.microsoft.com/VisualStudio/2011/storyboarding/control">
-  <Id Name="System.Storyboarding.Common.Breadcrumb" Revision="1" Stencil="System.Storyboarding.Common" StencilVersion="0.1"/>
+  <Id Name="System.Storyboarding.WindowsPhoneIcons.Minus" Revision="1" Stencil="System.Storyboarding.WindowsPhoneIcons" StencilVersion="0.1"/>
 </Control>
 </file>
 
 <file path=customXml/item45.xml><?xml version="1.0" encoding="utf-8"?>
 <Control xmlns="http://schemas.microsoft.com/VisualStudio/2011/storyboarding/control">
-  <Id Name="System.Storyboarding.Media.Image" Revision="1" Stencil="System.Storyboarding.Media" StencilVersion="0.1"/>
+  <Id Name="System.Storyboarding.Common.TextArea" Revision="1" Stencil="System.Storyboarding.Common" StencilVersion="0.1"/>
 </Control>
 </file>
 
 <file path=customXml/item46.xml><?xml version="1.0" encoding="utf-8"?>
 <Control xmlns="http://schemas.microsoft.com/VisualStudio/2011/storyboarding/control">
-  <Id Name="System.Storyboarding.WindowsPhoneIcons.BaseCircle" Revision="1" Stencil="System.Storyboarding.WindowsPhoneIcons" StencilVersion="0.1"/>
+  <Id Name="System.Storyboarding.Common.TextArea" Revision="1" Stencil="System.Storyboarding.Common" StencilVersion="0.1"/>
 </Control>
 </file>
 
 <file path=customXml/item47.xml><?xml version="1.0" encoding="utf-8"?>
 <Control xmlns="http://schemas.microsoft.com/VisualStudio/2011/storyboarding/control">
-  <Id Name="System.Storyboarding.WindowsPhone.ApplicationBar" Revision="1" Stencil="System.Storyboarding.WindowsPhone" StencilVersion="0.1"/>
+  <Id Name="System.Storyboarding.Common.Breadcrumb" Revision="1" Stencil="System.Storyboarding.Common" StencilVersion="0.1"/>
 </Control>
 </file>
 
 <file path=customXml/item5.xml><?xml version="1.0" encoding="utf-8"?>
 <Control xmlns="http://schemas.microsoft.com/VisualStudio/2011/storyboarding/control">
-  <Id Name="System.Storyboarding.WindowsPhoneIcons.BaseCircle" Revision="1" Stencil="System.Storyboarding.WindowsPhoneIcons" StencilVersion="0.1"/>
+  <Id Name="System.Storyboarding.WindowsPhoneIcons.Minus" Revision="1" Stencil="System.Storyboarding.WindowsPhoneIcons" StencilVersion="0.1"/>
 </Control>
 </file>
 
 <file path=customXml/item6.xml><?xml version="1.0" encoding="utf-8"?>
 <Control xmlns="http://schemas.microsoft.com/VisualStudio/2011/storyboarding/control">
-  <Id Name="System.Storyboarding.Common.Breadcrumb" Revision="1" Stencil="System.Storyboarding.Common" StencilVersion="0.1"/>
+  <Id Name="System.Storyboarding.Common.Text" Revision="1" Stencil="System.Storyboarding.Common" StencilVersion="0.1"/>
 </Control>
 </file>
 
 <file path=customXml/item7.xml><?xml version="1.0" encoding="utf-8"?>
 <Control xmlns="http://schemas.microsoft.com/VisualStudio/2011/storyboarding/control">
-  <Id Name="System.Storyboarding.Common.Text" Revision="1" Stencil="System.Storyboarding.Common" StencilVersion="0.1"/>
+  <Id Name="System.Storyboarding.WindowsPhone.ApplicationBar" Revision="1" Stencil="System.Storyboarding.WindowsPhone" StencilVersion="0.1"/>
 </Control>
 </file>
 
 <file path=customXml/item8.xml><?xml version="1.0" encoding="utf-8"?>
 <Control xmlns="http://schemas.microsoft.com/VisualStudio/2011/storyboarding/control">
-  <Id Name="System.Storyboarding.Common.TextArea" Revision="1" Stencil="System.Storyboarding.Common" StencilVersion="0.1"/>
+  <Id Name="System.Storyboarding.Common.Text" Revision="1" Stencil="System.Storyboarding.Common" StencilVersion="0.1"/>
 </Control>
 </file>
 
 <file path=customXml/item9.xml><?xml version="1.0" encoding="utf-8"?>
 <Control xmlns="http://schemas.microsoft.com/VisualStudio/2011/storyboarding/control">
-  <Id Name="System.Storyboarding.Common.Text" Revision="1" Stencil="System.Storyboarding.Common" StencilVersion="0.1"/>
+  <Id Name="System.Storyboarding.WindowsPhoneIcons.BaseCircle" Revision="1" Stencil="System.Storyboarding.WindowsPhoneIcons" StencilVersion="0.1"/>
 </Control>
 </file>
 
 <file path=customXml/itemProps1.xml><?xml version="1.0" encoding="utf-8"?>
-<ds:datastoreItem xmlns:ds="http://schemas.openxmlformats.org/officeDocument/2006/customXml" ds:itemID="{F7171423-D758-4661-A1CD-668A1B96AFB8}">
+<ds:datastoreItem xmlns:ds="http://schemas.openxmlformats.org/officeDocument/2006/customXml" ds:itemID="{E108BEC3-0795-4CAB-9EF4-D252AF70CF15}">
   <ds:schemaRefs>
     <ds:schemaRef ds:uri="http://schemas.microsoft.com/VisualStudio/2011/storyboarding/control"/>
   </ds:schemaRefs>
@@ -13980,7 +14595,7 @@
 </file>
 
 <file path=customXml/itemProps10.xml><?xml version="1.0" encoding="utf-8"?>
-<ds:datastoreItem xmlns:ds="http://schemas.openxmlformats.org/officeDocument/2006/customXml" ds:itemID="{635C062B-A454-4601-A040-4395FFED47FD}">
+<ds:datastoreItem xmlns:ds="http://schemas.openxmlformats.org/officeDocument/2006/customXml" ds:itemID="{B6C0F96A-AED6-437F-A71B-DE5297FACAE5}">
   <ds:schemaRefs>
     <ds:schemaRef ds:uri="http://schemas.microsoft.com/VisualStudio/2011/storyboarding/control"/>
   </ds:schemaRefs>
@@ -13988,7 +14603,7 @@
 </file>
 
 <file path=customXml/itemProps11.xml><?xml version="1.0" encoding="utf-8"?>
-<ds:datastoreItem xmlns:ds="http://schemas.openxmlformats.org/officeDocument/2006/customXml" ds:itemID="{70E72DF6-3694-4E6B-B583-2E6362F2B9A9}">
+<ds:datastoreItem xmlns:ds="http://schemas.openxmlformats.org/officeDocument/2006/customXml" ds:itemID="{F7672742-105B-4EDD-836D-3F441D984A62}">
   <ds:schemaRefs>
     <ds:schemaRef ds:uri="http://schemas.microsoft.com/VisualStudio/2011/storyboarding/control"/>
   </ds:schemaRefs>
@@ -13996,7 +14611,7 @@
 </file>
 
 <file path=customXml/itemProps12.xml><?xml version="1.0" encoding="utf-8"?>
-<ds:datastoreItem xmlns:ds="http://schemas.openxmlformats.org/officeDocument/2006/customXml" ds:itemID="{37FE8332-15AE-42AB-B658-6CA650AB87C9}">
+<ds:datastoreItem xmlns:ds="http://schemas.openxmlformats.org/officeDocument/2006/customXml" ds:itemID="{B6E3F448-D34E-4994-8CCB-D0E016B327E1}">
   <ds:schemaRefs>
     <ds:schemaRef ds:uri="http://schemas.microsoft.com/VisualStudio/2011/storyboarding/control"/>
   </ds:schemaRefs>
@@ -14004,7 +14619,7 @@
 </file>
 
 <file path=customXml/itemProps13.xml><?xml version="1.0" encoding="utf-8"?>
-<ds:datastoreItem xmlns:ds="http://schemas.openxmlformats.org/officeDocument/2006/customXml" ds:itemID="{99C67ED5-9855-430E-A3A4-0E30BEB0D024}">
+<ds:datastoreItem xmlns:ds="http://schemas.openxmlformats.org/officeDocument/2006/customXml" ds:itemID="{23EE2C33-3FB7-4956-B205-758C571E5672}">
   <ds:schemaRefs>
     <ds:schemaRef ds:uri="http://schemas.microsoft.com/VisualStudio/2011/storyboarding/control"/>
   </ds:schemaRefs>
@@ -14012,7 +14627,7 @@
 </file>
 
 <file path=customXml/itemProps14.xml><?xml version="1.0" encoding="utf-8"?>
-<ds:datastoreItem xmlns:ds="http://schemas.openxmlformats.org/officeDocument/2006/customXml" ds:itemID="{F9465E2D-3DCD-4B6E-83BF-F9A530097531}">
+<ds:datastoreItem xmlns:ds="http://schemas.openxmlformats.org/officeDocument/2006/customXml" ds:itemID="{4BB4F1BB-FA6F-4FE1-879D-988B2788852B}">
   <ds:schemaRefs>
     <ds:schemaRef ds:uri="http://schemas.microsoft.com/VisualStudio/2011/storyboarding/control"/>
   </ds:schemaRefs>
@@ -14020,7 +14635,7 @@
 </file>
 
 <file path=customXml/itemProps15.xml><?xml version="1.0" encoding="utf-8"?>
-<ds:datastoreItem xmlns:ds="http://schemas.openxmlformats.org/officeDocument/2006/customXml" ds:itemID="{EA9F5074-9F3D-4DB7-8B97-43B1B2E60445}">
+<ds:datastoreItem xmlns:ds="http://schemas.openxmlformats.org/officeDocument/2006/customXml" ds:itemID="{54E314B1-A325-45C9-A490-16B6BCA8B71F}">
   <ds:schemaRefs>
     <ds:schemaRef ds:uri="http://schemas.microsoft.com/VisualStudio/2011/storyboarding/control"/>
   </ds:schemaRefs>
@@ -14036,7 +14651,7 @@
 </file>
 
 <file path=customXml/itemProps17.xml><?xml version="1.0" encoding="utf-8"?>
-<ds:datastoreItem xmlns:ds="http://schemas.openxmlformats.org/officeDocument/2006/customXml" ds:itemID="{B6C0F96A-AED6-437F-A71B-DE5297FACAE5}">
+<ds:datastoreItem xmlns:ds="http://schemas.openxmlformats.org/officeDocument/2006/customXml" ds:itemID="{888D7319-B23C-4FD6-8814-58CD6528C672}">
   <ds:schemaRefs>
     <ds:schemaRef ds:uri="http://schemas.microsoft.com/VisualStudio/2011/storyboarding/control"/>
   </ds:schemaRefs>
@@ -14044,7 +14659,7 @@
 </file>
 
 <file path=customXml/itemProps18.xml><?xml version="1.0" encoding="utf-8"?>
-<ds:datastoreItem xmlns:ds="http://schemas.openxmlformats.org/officeDocument/2006/customXml" ds:itemID="{E108BEC3-0795-4CAB-9EF4-D252AF70CF15}">
+<ds:datastoreItem xmlns:ds="http://schemas.openxmlformats.org/officeDocument/2006/customXml" ds:itemID="{39A9D6F8-BAFF-4234-B897-869A60312AC4}">
   <ds:schemaRefs>
     <ds:schemaRef ds:uri="http://schemas.microsoft.com/VisualStudio/2011/storyboarding/control"/>
   </ds:schemaRefs>
@@ -14052,6 +14667,142 @@
 </file>
 
 <file path=customXml/itemProps19.xml><?xml version="1.0" encoding="utf-8"?>
+<ds:datastoreItem xmlns:ds="http://schemas.openxmlformats.org/officeDocument/2006/customXml" ds:itemID="{49537C2A-341F-4DF4-9E6E-2D4CA9B3C7D4}">
+  <ds:schemaRefs>
+    <ds:schemaRef ds:uri="http://schemas.microsoft.com/VisualStudio/2011/storyboarding/control"/>
+  </ds:schemaRefs>
+</ds:datastoreItem>
+</file>
+
+<file path=customXml/itemProps2.xml><?xml version="1.0" encoding="utf-8"?>
+<ds:datastoreItem xmlns:ds="http://schemas.openxmlformats.org/officeDocument/2006/customXml" ds:itemID="{0A80EB47-FECF-4BB2-A379-A295C50BCEC2}">
+  <ds:schemaRefs>
+    <ds:schemaRef ds:uri="http://schemas.microsoft.com/VisualStudio/2011/storyboarding/control"/>
+  </ds:schemaRefs>
+</ds:datastoreItem>
+</file>
+
+<file path=customXml/itemProps20.xml><?xml version="1.0" encoding="utf-8"?>
+<ds:datastoreItem xmlns:ds="http://schemas.openxmlformats.org/officeDocument/2006/customXml" ds:itemID="{F7171423-D758-4661-A1CD-668A1B96AFB8}">
+  <ds:schemaRefs>
+    <ds:schemaRef ds:uri="http://schemas.microsoft.com/VisualStudio/2011/storyboarding/control"/>
+  </ds:schemaRefs>
+</ds:datastoreItem>
+</file>
+
+<file path=customXml/itemProps21.xml><?xml version="1.0" encoding="utf-8"?>
+<ds:datastoreItem xmlns:ds="http://schemas.openxmlformats.org/officeDocument/2006/customXml" ds:itemID="{621CBAAB-BD57-4F30-96D5-4619B9F2E8F6}">
+  <ds:schemaRefs>
+    <ds:schemaRef ds:uri="http://schemas.microsoft.com/VisualStudio/2011/storyboarding/control"/>
+  </ds:schemaRefs>
+</ds:datastoreItem>
+</file>
+
+<file path=customXml/itemProps22.xml><?xml version="1.0" encoding="utf-8"?>
+<ds:datastoreItem xmlns:ds="http://schemas.openxmlformats.org/officeDocument/2006/customXml" ds:itemID="{70E72DF6-3694-4E6B-B583-2E6362F2B9A9}">
+  <ds:schemaRefs>
+    <ds:schemaRef ds:uri="http://schemas.microsoft.com/VisualStudio/2011/storyboarding/control"/>
+  </ds:schemaRefs>
+</ds:datastoreItem>
+</file>
+
+<file path=customXml/itemProps23.xml><?xml version="1.0" encoding="utf-8"?>
+<ds:datastoreItem xmlns:ds="http://schemas.openxmlformats.org/officeDocument/2006/customXml" ds:itemID="{363F6C48-1C65-46F0-BED4-1FA563841162}">
+  <ds:schemaRefs>
+    <ds:schemaRef ds:uri="http://schemas.microsoft.com/VisualStudio/2011/storyboarding/control"/>
+  </ds:schemaRefs>
+</ds:datastoreItem>
+</file>
+
+<file path=customXml/itemProps24.xml><?xml version="1.0" encoding="utf-8"?>
+<ds:datastoreItem xmlns:ds="http://schemas.openxmlformats.org/officeDocument/2006/customXml" ds:itemID="{8F7EFCB8-78E9-49C7-8AE1-1507F185ED8F}">
+  <ds:schemaRefs>
+    <ds:schemaRef ds:uri="http://schemas.microsoft.com/VisualStudio/2011/storyboarding/control"/>
+  </ds:schemaRefs>
+</ds:datastoreItem>
+</file>
+
+<file path=customXml/itemProps25.xml><?xml version="1.0" encoding="utf-8"?>
+<ds:datastoreItem xmlns:ds="http://schemas.openxmlformats.org/officeDocument/2006/customXml" ds:itemID="{028823D6-2941-4700-91F5-38924448BF93}">
+  <ds:schemaRefs>
+    <ds:schemaRef ds:uri="http://schemas.microsoft.com/VisualStudio/2011/storyboarding/control"/>
+  </ds:schemaRefs>
+</ds:datastoreItem>
+</file>
+
+<file path=customXml/itemProps26.xml><?xml version="1.0" encoding="utf-8"?>
+<ds:datastoreItem xmlns:ds="http://schemas.openxmlformats.org/officeDocument/2006/customXml" ds:itemID="{53D9FF8E-AA75-4A57-B6AF-96ABB2288E03}">
+  <ds:schemaRefs>
+    <ds:schemaRef ds:uri="http://schemas.microsoft.com/VisualStudio/2011/storyboarding/control"/>
+  </ds:schemaRefs>
+</ds:datastoreItem>
+</file>
+
+<file path=customXml/itemProps27.xml><?xml version="1.0" encoding="utf-8"?>
+<ds:datastoreItem xmlns:ds="http://schemas.openxmlformats.org/officeDocument/2006/customXml" ds:itemID="{5383A712-1360-49D8-B822-6A8778800F3A}">
+  <ds:schemaRefs>
+    <ds:schemaRef ds:uri="http://schemas.microsoft.com/VisualStudio/2011/storyboarding/control"/>
+  </ds:schemaRefs>
+</ds:datastoreItem>
+</file>
+
+<file path=customXml/itemProps28.xml><?xml version="1.0" encoding="utf-8"?>
+<ds:datastoreItem xmlns:ds="http://schemas.openxmlformats.org/officeDocument/2006/customXml" ds:itemID="{729CB2F5-0508-4E91-9601-64296AA45CDD}">
+  <ds:schemaRefs>
+    <ds:schemaRef ds:uri="http://schemas.microsoft.com/VisualStudio/2011/storyboarding/control"/>
+  </ds:schemaRefs>
+</ds:datastoreItem>
+</file>
+
+<file path=customXml/itemProps29.xml><?xml version="1.0" encoding="utf-8"?>
+<ds:datastoreItem xmlns:ds="http://schemas.openxmlformats.org/officeDocument/2006/customXml" ds:itemID="{EA9F5074-9F3D-4DB7-8B97-43B1B2E60445}">
+  <ds:schemaRefs>
+    <ds:schemaRef ds:uri="http://schemas.microsoft.com/VisualStudio/2011/storyboarding/control"/>
+  </ds:schemaRefs>
+</ds:datastoreItem>
+</file>
+
+<file path=customXml/itemProps3.xml><?xml version="1.0" encoding="utf-8"?>
+<ds:datastoreItem xmlns:ds="http://schemas.openxmlformats.org/officeDocument/2006/customXml" ds:itemID="{D095929A-96E0-42AA-8C75-5FCFF3F5A0A5}">
+  <ds:schemaRefs>
+    <ds:schemaRef ds:uri="http://schemas.microsoft.com/VisualStudio/2011/storyboarding/control"/>
+  </ds:schemaRefs>
+</ds:datastoreItem>
+</file>
+
+<file path=customXml/itemProps30.xml><?xml version="1.0" encoding="utf-8"?>
+<ds:datastoreItem xmlns:ds="http://schemas.openxmlformats.org/officeDocument/2006/customXml" ds:itemID="{8131C082-8AC0-43A7-95BF-31C4D6889FAB}">
+  <ds:schemaRefs>
+    <ds:schemaRef ds:uri="http://schemas.microsoft.com/VisualStudio/2011/storyboarding/control"/>
+  </ds:schemaRefs>
+</ds:datastoreItem>
+</file>
+
+<file path=customXml/itemProps31.xml><?xml version="1.0" encoding="utf-8"?>
+<ds:datastoreItem xmlns:ds="http://schemas.openxmlformats.org/officeDocument/2006/customXml" ds:itemID="{62C1AE7A-F593-4AFC-9940-8B9396F9330A}">
+  <ds:schemaRefs>
+    <ds:schemaRef ds:uri="http://schemas.microsoft.com/VisualStudio/2011/storyboarding/control"/>
+  </ds:schemaRefs>
+</ds:datastoreItem>
+</file>
+
+<file path=customXml/itemProps32.xml><?xml version="1.0" encoding="utf-8"?>
+<ds:datastoreItem xmlns:ds="http://schemas.openxmlformats.org/officeDocument/2006/customXml" ds:itemID="{3B03A545-63C3-4900-AFA3-21C87CDF78E2}">
+  <ds:schemaRefs>
+    <ds:schemaRef ds:uri="http://schemas.microsoft.com/VisualStudio/2011/storyboarding/control"/>
+  </ds:schemaRefs>
+</ds:datastoreItem>
+</file>
+
+<file path=customXml/itemProps33.xml><?xml version="1.0" encoding="utf-8"?>
+<ds:datastoreItem xmlns:ds="http://schemas.openxmlformats.org/officeDocument/2006/customXml" ds:itemID="{635C062B-A454-4601-A040-4395FFED47FD}">
+  <ds:schemaRefs>
+    <ds:schemaRef ds:uri="http://schemas.microsoft.com/VisualStudio/2011/storyboarding/control"/>
+  </ds:schemaRefs>
+</ds:datastoreItem>
+</file>
+
+<file path=customXml/itemProps34.xml><?xml version="1.0" encoding="utf-8"?>
 <ds:datastoreItem xmlns:ds="http://schemas.openxmlformats.org/officeDocument/2006/customXml" ds:itemID="{2B7913F1-1AA3-45B3-BC9F-F7DB0444A344}">
   <ds:schemaRefs>
     <ds:schemaRef ds:uri="http://schemas.microsoft.com/VisualStudio/2011/storyboarding/control"/>
@@ -14059,23 +14810,47 @@
 </ds:datastoreItem>
 </file>
 
-<file path=customXml/itemProps2.xml><?xml version="1.0" encoding="utf-8"?>
-<ds:datastoreItem xmlns:ds="http://schemas.openxmlformats.org/officeDocument/2006/customXml" ds:itemID="{54E314B1-A325-45C9-A490-16B6BCA8B71F}">
+<file path=customXml/itemProps35.xml><?xml version="1.0" encoding="utf-8"?>
+<ds:datastoreItem xmlns:ds="http://schemas.openxmlformats.org/officeDocument/2006/customXml" ds:itemID="{E18FB959-9303-43FE-8E05-C5E316A9C43C}">
   <ds:schemaRefs>
     <ds:schemaRef ds:uri="http://schemas.microsoft.com/VisualStudio/2011/storyboarding/control"/>
   </ds:schemaRefs>
 </ds:datastoreItem>
 </file>
 
-<file path=customXml/itemProps20.xml><?xml version="1.0" encoding="utf-8"?>
-<ds:datastoreItem xmlns:ds="http://schemas.openxmlformats.org/officeDocument/2006/customXml" ds:itemID="{888D7319-B23C-4FD6-8814-58CD6528C672}">
+<file path=customXml/itemProps36.xml><?xml version="1.0" encoding="utf-8"?>
+<ds:datastoreItem xmlns:ds="http://schemas.openxmlformats.org/officeDocument/2006/customXml" ds:itemID="{97AC04A7-A312-4FE7-BD3C-AAD10B6A127C}">
   <ds:schemaRefs>
     <ds:schemaRef ds:uri="http://schemas.microsoft.com/VisualStudio/2011/storyboarding/control"/>
   </ds:schemaRefs>
 </ds:datastoreItem>
 </file>
 
-<file path=customXml/itemProps21.xml><?xml version="1.0" encoding="utf-8"?>
+<file path=customXml/itemProps37.xml><?xml version="1.0" encoding="utf-8"?>
+<ds:datastoreItem xmlns:ds="http://schemas.openxmlformats.org/officeDocument/2006/customXml" ds:itemID="{F99BE8F6-6351-4BC3-9791-85F2EC01E882}">
+  <ds:schemaRefs>
+    <ds:schemaRef ds:uri="http://schemas.microsoft.com/VisualStudio/2011/storyboarding/control"/>
+  </ds:schemaRefs>
+</ds:datastoreItem>
+</file>
+
+<file path=customXml/itemProps38.xml><?xml version="1.0" encoding="utf-8"?>
+<ds:datastoreItem xmlns:ds="http://schemas.openxmlformats.org/officeDocument/2006/customXml" ds:itemID="{9EEE4458-FB40-4680-AD3B-7918F0F3E4C3}">
+  <ds:schemaRefs>
+    <ds:schemaRef ds:uri="http://schemas.microsoft.com/VisualStudio/2011/storyboarding/control"/>
+  </ds:schemaRefs>
+</ds:datastoreItem>
+</file>
+
+<file path=customXml/itemProps39.xml><?xml version="1.0" encoding="utf-8"?>
+<ds:datastoreItem xmlns:ds="http://schemas.openxmlformats.org/officeDocument/2006/customXml" ds:itemID="{F9465E2D-3DCD-4B6E-83BF-F9A530097531}">
+  <ds:schemaRefs>
+    <ds:schemaRef ds:uri="http://schemas.microsoft.com/VisualStudio/2011/storyboarding/control"/>
+  </ds:schemaRefs>
+</ds:datastoreItem>
+</file>
+
+<file path=customXml/itemProps4.xml><?xml version="1.0" encoding="utf-8"?>
 <ds:datastoreItem xmlns:ds="http://schemas.openxmlformats.org/officeDocument/2006/customXml" ds:itemID="{EBE7D2B6-F1C5-4751-BCA9-78224F79779F}">
   <ds:schemaRefs>
     <ds:schemaRef ds:uri="http://schemas.microsoft.com/VisualStudio/2011/storyboarding/control"/>
@@ -14083,7 +14858,7 @@
 </ds:datastoreItem>
 </file>
 
-<file path=customXml/itemProps22.xml><?xml version="1.0" encoding="utf-8"?>
+<file path=customXml/itemProps40.xml><?xml version="1.0" encoding="utf-8"?>
 <ds:datastoreItem xmlns:ds="http://schemas.openxmlformats.org/officeDocument/2006/customXml" ds:itemID="{DCD166D2-DF9D-490A-8D61-E66FB6C4566C}">
   <ds:schemaRefs>
     <ds:schemaRef ds:uri="http://schemas.microsoft.com/VisualStudio/2011/storyboarding/control"/>
@@ -14091,39 +14866,7 @@
 </ds:datastoreItem>
 </file>
 
-<file path=customXml/itemProps23.xml><?xml version="1.0" encoding="utf-8"?>
-<ds:datastoreItem xmlns:ds="http://schemas.openxmlformats.org/officeDocument/2006/customXml" ds:itemID="{8131C082-8AC0-43A7-95BF-31C4D6889FAB}">
-  <ds:schemaRefs>
-    <ds:schemaRef ds:uri="http://schemas.microsoft.com/VisualStudio/2011/storyboarding/control"/>
-  </ds:schemaRefs>
-</ds:datastoreItem>
-</file>
-
-<file path=customXml/itemProps24.xml><?xml version="1.0" encoding="utf-8"?>
-<ds:datastoreItem xmlns:ds="http://schemas.openxmlformats.org/officeDocument/2006/customXml" ds:itemID="{363F6C48-1C65-46F0-BED4-1FA563841162}">
-  <ds:schemaRefs>
-    <ds:schemaRef ds:uri="http://schemas.microsoft.com/VisualStudio/2011/storyboarding/control"/>
-  </ds:schemaRefs>
-</ds:datastoreItem>
-</file>
-
-<file path=customXml/itemProps25.xml><?xml version="1.0" encoding="utf-8"?>
-<ds:datastoreItem xmlns:ds="http://schemas.openxmlformats.org/officeDocument/2006/customXml" ds:itemID="{F7672742-105B-4EDD-836D-3F441D984A62}">
-  <ds:schemaRefs>
-    <ds:schemaRef ds:uri="http://schemas.microsoft.com/VisualStudio/2011/storyboarding/control"/>
-  </ds:schemaRefs>
-</ds:datastoreItem>
-</file>
-
-<file path=customXml/itemProps26.xml><?xml version="1.0" encoding="utf-8"?>
-<ds:datastoreItem xmlns:ds="http://schemas.openxmlformats.org/officeDocument/2006/customXml" ds:itemID="{0A80EB47-FECF-4BB2-A379-A295C50BCEC2}">
-  <ds:schemaRefs>
-    <ds:schemaRef ds:uri="http://schemas.microsoft.com/VisualStudio/2011/storyboarding/control"/>
-  </ds:schemaRefs>
-</ds:datastoreItem>
-</file>
-
-<file path=customXml/itemProps27.xml><?xml version="1.0" encoding="utf-8"?>
+<file path=customXml/itemProps41.xml><?xml version="1.0" encoding="utf-8"?>
 <ds:datastoreItem xmlns:ds="http://schemas.openxmlformats.org/officeDocument/2006/customXml" ds:itemID="{DB055F61-50D5-4F3E-9D0E-31D0C3A82C8B}">
   <ds:schemaRefs>
     <ds:schemaRef ds:uri="http://schemas.microsoft.com/VisualStudio/2011/storyboarding/control"/>
@@ -14131,23 +14874,39 @@
 </ds:datastoreItem>
 </file>
 
-<file path=customXml/itemProps28.xml><?xml version="1.0" encoding="utf-8"?>
-<ds:datastoreItem xmlns:ds="http://schemas.openxmlformats.org/officeDocument/2006/customXml" ds:itemID="{62C1AE7A-F593-4AFC-9940-8B9396F9330A}">
+<file path=customXml/itemProps42.xml><?xml version="1.0" encoding="utf-8"?>
+<ds:datastoreItem xmlns:ds="http://schemas.openxmlformats.org/officeDocument/2006/customXml" ds:itemID="{E57F9A53-6CA8-49C7-A565-51CED1F902E5}">
   <ds:schemaRefs>
     <ds:schemaRef ds:uri="http://schemas.microsoft.com/VisualStudio/2011/storyboarding/control"/>
   </ds:schemaRefs>
 </ds:datastoreItem>
 </file>
 
-<file path=customXml/itemProps29.xml><?xml version="1.0" encoding="utf-8"?>
-<ds:datastoreItem xmlns:ds="http://schemas.openxmlformats.org/officeDocument/2006/customXml" ds:itemID="{39A9D6F8-BAFF-4234-B897-869A60312AC4}">
+<file path=customXml/itemProps43.xml><?xml version="1.0" encoding="utf-8"?>
+<ds:datastoreItem xmlns:ds="http://schemas.openxmlformats.org/officeDocument/2006/customXml" ds:itemID="{79F7387A-720F-4080-90A1-AE35649A27BC}">
   <ds:schemaRefs>
     <ds:schemaRef ds:uri="http://schemas.microsoft.com/VisualStudio/2011/storyboarding/control"/>
   </ds:schemaRefs>
 </ds:datastoreItem>
 </file>
 
-<file path=customXml/itemProps3.xml><?xml version="1.0" encoding="utf-8"?>
+<file path=customXml/itemProps44.xml><?xml version="1.0" encoding="utf-8"?>
+<ds:datastoreItem xmlns:ds="http://schemas.openxmlformats.org/officeDocument/2006/customXml" ds:itemID="{BFDDD1E5-6EE8-43FF-A326-D72E6AE35696}">
+  <ds:schemaRefs>
+    <ds:schemaRef ds:uri="http://schemas.microsoft.com/VisualStudio/2011/storyboarding/control"/>
+  </ds:schemaRefs>
+</ds:datastoreItem>
+</file>
+
+<file path=customXml/itemProps45.xml><?xml version="1.0" encoding="utf-8"?>
+<ds:datastoreItem xmlns:ds="http://schemas.openxmlformats.org/officeDocument/2006/customXml" ds:itemID="{709B4058-9130-4EBC-80FE-85096BCD3B4F}">
+  <ds:schemaRefs>
+    <ds:schemaRef ds:uri="http://schemas.microsoft.com/VisualStudio/2011/storyboarding/control"/>
+  </ds:schemaRefs>
+</ds:datastoreItem>
+</file>
+
+<file path=customXml/itemProps46.xml><?xml version="1.0" encoding="utf-8"?>
 <ds:datastoreItem xmlns:ds="http://schemas.openxmlformats.org/officeDocument/2006/customXml" ds:itemID="{869A052F-7AA3-48CF-B37E-9F2F55475F6A}">
   <ds:schemaRefs>
     <ds:schemaRef ds:uri="http://schemas.microsoft.com/VisualStudio/2011/storyboarding/control"/>
@@ -14155,39 +14914,15 @@
 </ds:datastoreItem>
 </file>
 
-<file path=customXml/itemProps30.xml><?xml version="1.0" encoding="utf-8"?>
-<ds:datastoreItem xmlns:ds="http://schemas.openxmlformats.org/officeDocument/2006/customXml" ds:itemID="{E57F9A53-6CA8-49C7-A565-51CED1F902E5}">
+<file path=customXml/itemProps47.xml><?xml version="1.0" encoding="utf-8"?>
+<ds:datastoreItem xmlns:ds="http://schemas.openxmlformats.org/officeDocument/2006/customXml" ds:itemID="{99C67ED5-9855-430E-A3A4-0E30BEB0D024}">
   <ds:schemaRefs>
     <ds:schemaRef ds:uri="http://schemas.microsoft.com/VisualStudio/2011/storyboarding/control"/>
   </ds:schemaRefs>
 </ds:datastoreItem>
 </file>
 
-<file path=customXml/itemProps31.xml><?xml version="1.0" encoding="utf-8"?>
-<ds:datastoreItem xmlns:ds="http://schemas.openxmlformats.org/officeDocument/2006/customXml" ds:itemID="{E18FB959-9303-43FE-8E05-C5E316A9C43C}">
-  <ds:schemaRefs>
-    <ds:schemaRef ds:uri="http://schemas.microsoft.com/VisualStudio/2011/storyboarding/control"/>
-  </ds:schemaRefs>
-</ds:datastoreItem>
-</file>
-
-<file path=customXml/itemProps32.xml><?xml version="1.0" encoding="utf-8"?>
-<ds:datastoreItem xmlns:ds="http://schemas.openxmlformats.org/officeDocument/2006/customXml" ds:itemID="{8F7EFCB8-78E9-49C7-8AE1-1507F185ED8F}">
-  <ds:schemaRefs>
-    <ds:schemaRef ds:uri="http://schemas.microsoft.com/VisualStudio/2011/storyboarding/control"/>
-  </ds:schemaRefs>
-</ds:datastoreItem>
-</file>
-
-<file path=customXml/itemProps33.xml><?xml version="1.0" encoding="utf-8"?>
-<ds:datastoreItem xmlns:ds="http://schemas.openxmlformats.org/officeDocument/2006/customXml" ds:itemID="{B6E3F448-D34E-4994-8CCB-D0E016B327E1}">
-  <ds:schemaRefs>
-    <ds:schemaRef ds:uri="http://schemas.microsoft.com/VisualStudio/2011/storyboarding/control"/>
-  </ds:schemaRefs>
-</ds:datastoreItem>
-</file>
-
-<file path=customXml/itemProps34.xml><?xml version="1.0" encoding="utf-8"?>
+<file path=customXml/itemProps5.xml><?xml version="1.0" encoding="utf-8"?>
 <ds:datastoreItem xmlns:ds="http://schemas.openxmlformats.org/officeDocument/2006/customXml" ds:itemID="{614FB6CF-2EEF-41C6-BA3C-CE3697AD49F4}">
   <ds:schemaRefs>
     <ds:schemaRef ds:uri="http://schemas.microsoft.com/VisualStudio/2011/storyboarding/control"/>
@@ -14195,71 +14930,7 @@
 </ds:datastoreItem>
 </file>
 
-<file path=customXml/itemProps35.xml><?xml version="1.0" encoding="utf-8"?>
-<ds:datastoreItem xmlns:ds="http://schemas.openxmlformats.org/officeDocument/2006/customXml" ds:itemID="{79F7387A-720F-4080-90A1-AE35649A27BC}">
-  <ds:schemaRefs>
-    <ds:schemaRef ds:uri="http://schemas.microsoft.com/VisualStudio/2011/storyboarding/control"/>
-  </ds:schemaRefs>
-</ds:datastoreItem>
-</file>
-
-<file path=customXml/itemProps36.xml><?xml version="1.0" encoding="utf-8"?>
-<ds:datastoreItem xmlns:ds="http://schemas.openxmlformats.org/officeDocument/2006/customXml" ds:itemID="{3B03A545-63C3-4900-AFA3-21C87CDF78E2}">
-  <ds:schemaRefs>
-    <ds:schemaRef ds:uri="http://schemas.microsoft.com/VisualStudio/2011/storyboarding/control"/>
-  </ds:schemaRefs>
-</ds:datastoreItem>
-</file>
-
-<file path=customXml/itemProps37.xml><?xml version="1.0" encoding="utf-8"?>
-<ds:datastoreItem xmlns:ds="http://schemas.openxmlformats.org/officeDocument/2006/customXml" ds:itemID="{028823D6-2941-4700-91F5-38924448BF93}">
-  <ds:schemaRefs>
-    <ds:schemaRef ds:uri="http://schemas.microsoft.com/VisualStudio/2011/storyboarding/control"/>
-  </ds:schemaRefs>
-</ds:datastoreItem>
-</file>
-
-<file path=customXml/itemProps38.xml><?xml version="1.0" encoding="utf-8"?>
-<ds:datastoreItem xmlns:ds="http://schemas.openxmlformats.org/officeDocument/2006/customXml" ds:itemID="{23EE2C33-3FB7-4956-B205-758C571E5672}">
-  <ds:schemaRefs>
-    <ds:schemaRef ds:uri="http://schemas.microsoft.com/VisualStudio/2011/storyboarding/control"/>
-  </ds:schemaRefs>
-</ds:datastoreItem>
-</file>
-
-<file path=customXml/itemProps39.xml><?xml version="1.0" encoding="utf-8"?>
-<ds:datastoreItem xmlns:ds="http://schemas.openxmlformats.org/officeDocument/2006/customXml" ds:itemID="{D095929A-96E0-42AA-8C75-5FCFF3F5A0A5}">
-  <ds:schemaRefs>
-    <ds:schemaRef ds:uri="http://schemas.microsoft.com/VisualStudio/2011/storyboarding/control"/>
-  </ds:schemaRefs>
-</ds:datastoreItem>
-</file>
-
-<file path=customXml/itemProps4.xml><?xml version="1.0" encoding="utf-8"?>
-<ds:datastoreItem xmlns:ds="http://schemas.openxmlformats.org/officeDocument/2006/customXml" ds:itemID="{F99BE8F6-6351-4BC3-9791-85F2EC01E882}">
-  <ds:schemaRefs>
-    <ds:schemaRef ds:uri="http://schemas.microsoft.com/VisualStudio/2011/storyboarding/control"/>
-  </ds:schemaRefs>
-</ds:datastoreItem>
-</file>
-
-<file path=customXml/itemProps40.xml><?xml version="1.0" encoding="utf-8"?>
-<ds:datastoreItem xmlns:ds="http://schemas.openxmlformats.org/officeDocument/2006/customXml" ds:itemID="{53D9FF8E-AA75-4A57-B6AF-96ABB2288E03}">
-  <ds:schemaRefs>
-    <ds:schemaRef ds:uri="http://schemas.microsoft.com/VisualStudio/2011/storyboarding/control"/>
-  </ds:schemaRefs>
-</ds:datastoreItem>
-</file>
-
-<file path=customXml/itemProps41.xml><?xml version="1.0" encoding="utf-8"?>
-<ds:datastoreItem xmlns:ds="http://schemas.openxmlformats.org/officeDocument/2006/customXml" ds:itemID="{49537C2A-341F-4DF4-9E6E-2D4CA9B3C7D4}">
-  <ds:schemaRefs>
-    <ds:schemaRef ds:uri="http://schemas.microsoft.com/VisualStudio/2011/storyboarding/control"/>
-  </ds:schemaRefs>
-</ds:datastoreItem>
-</file>
-
-<file path=customXml/itemProps42.xml><?xml version="1.0" encoding="utf-8"?>
+<file path=customXml/itemProps6.xml><?xml version="1.0" encoding="utf-8"?>
 <ds:datastoreItem xmlns:ds="http://schemas.openxmlformats.org/officeDocument/2006/customXml" ds:itemID="{E7B2DC0D-E2A8-402E-8916-30061578DE94}">
   <ds:schemaRefs>
     <ds:schemaRef ds:uri="http://schemas.microsoft.com/VisualStudio/2011/storyboarding/control"/>
@@ -14267,39 +14938,7 @@
 </ds:datastoreItem>
 </file>
 
-<file path=customXml/itemProps43.xml><?xml version="1.0" encoding="utf-8"?>
-<ds:datastoreItem xmlns:ds="http://schemas.openxmlformats.org/officeDocument/2006/customXml" ds:itemID="{BFDDD1E5-6EE8-43FF-A326-D72E6AE35696}">
-  <ds:schemaRefs>
-    <ds:schemaRef ds:uri="http://schemas.microsoft.com/VisualStudio/2011/storyboarding/control"/>
-  </ds:schemaRefs>
-</ds:datastoreItem>
-</file>
-
-<file path=customXml/itemProps44.xml><?xml version="1.0" encoding="utf-8"?>
-<ds:datastoreItem xmlns:ds="http://schemas.openxmlformats.org/officeDocument/2006/customXml" ds:itemID="{97AC04A7-A312-4FE7-BD3C-AAD10B6A127C}">
-  <ds:schemaRefs>
-    <ds:schemaRef ds:uri="http://schemas.microsoft.com/VisualStudio/2011/storyboarding/control"/>
-  </ds:schemaRefs>
-</ds:datastoreItem>
-</file>
-
-<file path=customXml/itemProps45.xml><?xml version="1.0" encoding="utf-8"?>
-<ds:datastoreItem xmlns:ds="http://schemas.openxmlformats.org/officeDocument/2006/customXml" ds:itemID="{5383A712-1360-49D8-B822-6A8778800F3A}">
-  <ds:schemaRefs>
-    <ds:schemaRef ds:uri="http://schemas.microsoft.com/VisualStudio/2011/storyboarding/control"/>
-  </ds:schemaRefs>
-</ds:datastoreItem>
-</file>
-
-<file path=customXml/itemProps46.xml><?xml version="1.0" encoding="utf-8"?>
-<ds:datastoreItem xmlns:ds="http://schemas.openxmlformats.org/officeDocument/2006/customXml" ds:itemID="{4BB4F1BB-FA6F-4FE1-879D-988B2788852B}">
-  <ds:schemaRefs>
-    <ds:schemaRef ds:uri="http://schemas.microsoft.com/VisualStudio/2011/storyboarding/control"/>
-  </ds:schemaRefs>
-</ds:datastoreItem>
-</file>
-
-<file path=customXml/itemProps47.xml><?xml version="1.0" encoding="utf-8"?>
+<file path=customXml/itemProps7.xml><?xml version="1.0" encoding="utf-8"?>
 <ds:datastoreItem xmlns:ds="http://schemas.openxmlformats.org/officeDocument/2006/customXml" ds:itemID="{34C1AE00-3D8A-491E-9699-D533C1701732}">
   <ds:schemaRefs>
     <ds:schemaRef ds:uri="http://schemas.microsoft.com/VisualStudio/2011/storyboarding/control"/>
@@ -14307,23 +14946,7 @@
 </ds:datastoreItem>
 </file>
 
-<file path=customXml/itemProps5.xml><?xml version="1.0" encoding="utf-8"?>
-<ds:datastoreItem xmlns:ds="http://schemas.openxmlformats.org/officeDocument/2006/customXml" ds:itemID="{729CB2F5-0508-4E91-9601-64296AA45CDD}">
-  <ds:schemaRefs>
-    <ds:schemaRef ds:uri="http://schemas.microsoft.com/VisualStudio/2011/storyboarding/control"/>
-  </ds:schemaRefs>
-</ds:datastoreItem>
-</file>
-
-<file path=customXml/itemProps6.xml><?xml version="1.0" encoding="utf-8"?>
-<ds:datastoreItem xmlns:ds="http://schemas.openxmlformats.org/officeDocument/2006/customXml" ds:itemID="{621CBAAB-BD57-4F30-96D5-4619B9F2E8F6}">
-  <ds:schemaRefs>
-    <ds:schemaRef ds:uri="http://schemas.microsoft.com/VisualStudio/2011/storyboarding/control"/>
-  </ds:schemaRefs>
-</ds:datastoreItem>
-</file>
-
-<file path=customXml/itemProps7.xml><?xml version="1.0" encoding="utf-8"?>
+<file path=customXml/itemProps8.xml><?xml version="1.0" encoding="utf-8"?>
 <ds:datastoreItem xmlns:ds="http://schemas.openxmlformats.org/officeDocument/2006/customXml" ds:itemID="{BE0E1101-E2AE-48BE-9D0B-AE425D1083C5}">
   <ds:schemaRefs>
     <ds:schemaRef ds:uri="http://schemas.microsoft.com/VisualStudio/2011/storyboarding/control"/>
@@ -14331,16 +14954,8 @@
 </ds:datastoreItem>
 </file>
 
-<file path=customXml/itemProps8.xml><?xml version="1.0" encoding="utf-8"?>
-<ds:datastoreItem xmlns:ds="http://schemas.openxmlformats.org/officeDocument/2006/customXml" ds:itemID="{709B4058-9130-4EBC-80FE-85096BCD3B4F}">
-  <ds:schemaRefs>
-    <ds:schemaRef ds:uri="http://schemas.microsoft.com/VisualStudio/2011/storyboarding/control"/>
-  </ds:schemaRefs>
-</ds:datastoreItem>
-</file>
-
 <file path=customXml/itemProps9.xml><?xml version="1.0" encoding="utf-8"?>
-<ds:datastoreItem xmlns:ds="http://schemas.openxmlformats.org/officeDocument/2006/customXml" ds:itemID="{9EEE4458-FB40-4680-AD3B-7918F0F3E4C3}">
+<ds:datastoreItem xmlns:ds="http://schemas.openxmlformats.org/officeDocument/2006/customXml" ds:itemID="{37FE8332-15AE-42AB-B658-6CA650AB87C9}">
   <ds:schemaRefs>
     <ds:schemaRef ds:uri="http://schemas.microsoft.com/VisualStudio/2011/storyboarding/control"/>
   </ds:schemaRefs>

</xml_diff>